<commit_message>
updated slides to match new-style strategies
</commit_message>
<xml_diff>
--- a/Slides/Lesson 8.2 Halting Measures.pptx
+++ b/Slides/Lesson 8.2 Halting Measures.pptx
@@ -246,7 +246,7 @@
             <a:fld id="{CF8F25F6-E1EF-4065-8525-42EDEBD9BD22}" type="datetimeFigureOut">
               <a:rPr lang="en-US" smtClean="0"/>
               <a:pPr/>
-              <a:t>10/5/2015</a:t>
+              <a:t>10/16/2015</a:t>
             </a:fld>
             <a:endParaRPr lang="en-US"/>
           </a:p>
@@ -1213,7 +1213,7 @@
           <a:p>
             <a:fld id="{2F1F79F5-7BEC-496A-AFC7-876E38F64D71}" type="datetime1">
               <a:rPr lang="en-US" smtClean="0"/>
-              <a:t>10/5/2015</a:t>
+              <a:t>10/16/2015</a:t>
             </a:fld>
             <a:endParaRPr lang="en-US"/>
           </a:p>
@@ -1315,7 +1315,7 @@
           <a:p>
             <a:fld id="{0A05703A-7669-4FEA-9056-25299B4D29D4}" type="datetime1">
               <a:rPr lang="en-US" smtClean="0"/>
-              <a:t>10/5/2015</a:t>
+              <a:t>10/16/2015</a:t>
             </a:fld>
             <a:endParaRPr lang="en-US"/>
           </a:p>
@@ -1592,7 +1592,7 @@
           <a:p>
             <a:fld id="{6E5077B5-BB57-49DB-88CA-226A139E5C01}" type="datetime1">
               <a:rPr lang="en-US" smtClean="0"/>
-              <a:t>10/5/2015</a:t>
+              <a:t>10/16/2015</a:t>
             </a:fld>
             <a:endParaRPr lang="en-US"/>
           </a:p>
@@ -1845,7 +1845,7 @@
           <a:p>
             <a:fld id="{C48D9447-CBD6-49A1-89FD-8512A8CF8999}" type="datetime1">
               <a:rPr lang="en-US" smtClean="0"/>
-              <a:t>10/5/2015</a:t>
+              <a:t>10/16/2015</a:t>
             </a:fld>
             <a:endParaRPr lang="en-US"/>
           </a:p>
@@ -2015,7 +2015,7 @@
           <a:p>
             <a:fld id="{A3639A2A-823D-48B7-9ACE-7FAF42870BA9}" type="datetime1">
               <a:rPr lang="en-US" smtClean="0"/>
-              <a:t>10/5/2015</a:t>
+              <a:t>10/16/2015</a:t>
             </a:fld>
             <a:endParaRPr lang="en-US"/>
           </a:p>
@@ -2195,7 +2195,7 @@
           <a:p>
             <a:fld id="{ED1B6996-82E9-463C-972C-7B56056E426C}" type="datetime1">
               <a:rPr lang="en-US" smtClean="0"/>
-              <a:t>10/5/2015</a:t>
+              <a:t>10/16/2015</a:t>
             </a:fld>
             <a:endParaRPr lang="en-US"/>
           </a:p>
@@ -2371,7 +2371,7 @@
           <a:p>
             <a:fld id="{E22ED4DA-448D-4BB1-B935-CC112220207B}" type="datetime1">
               <a:rPr lang="en-US" smtClean="0"/>
-              <a:t>10/5/2015</a:t>
+              <a:t>10/16/2015</a:t>
             </a:fld>
             <a:endParaRPr lang="en-US"/>
           </a:p>
@@ -2553,7 +2553,7 @@
           <a:p>
             <a:fld id="{E22ED4DA-448D-4BB1-B935-CC112220207B}" type="datetime1">
               <a:rPr lang="en-US" smtClean="0"/>
-              <a:t>10/5/2015</a:t>
+              <a:t>10/16/2015</a:t>
             </a:fld>
             <a:endParaRPr lang="en-US"/>
           </a:p>
@@ -2822,7 +2822,7 @@
           <a:p>
             <a:fld id="{FF5D65A6-AB94-4435-B0B7-3743215FA46C}" type="datetime1">
               <a:rPr lang="en-US" smtClean="0"/>
-              <a:t>10/5/2015</a:t>
+              <a:t>10/16/2015</a:t>
             </a:fld>
             <a:endParaRPr lang="en-US"/>
           </a:p>
@@ -3007,7 +3007,7 @@
           <a:p>
             <a:fld id="{FF5D65A6-AB94-4435-B0B7-3743215FA46C}" type="datetime1">
               <a:rPr lang="en-US" smtClean="0"/>
-              <a:t>10/5/2015</a:t>
+              <a:t>10/16/2015</a:t>
             </a:fld>
             <a:endParaRPr lang="en-US"/>
           </a:p>
@@ -3309,7 +3309,7 @@
           <a:p>
             <a:fld id="{7C193DC4-6EF0-48C9-B29C-616106A645E1}" type="datetime1">
               <a:rPr lang="en-US" smtClean="0"/>
-              <a:t>10/5/2015</a:t>
+              <a:t>10/16/2015</a:t>
             </a:fld>
             <a:endParaRPr lang="en-US"/>
           </a:p>
@@ -3597,7 +3597,7 @@
           <a:p>
             <a:fld id="{5D1846AD-9252-4647-9435-4C2AC365653A}" type="datetime1">
               <a:rPr lang="en-US" smtClean="0"/>
-              <a:t>10/5/2015</a:t>
+              <a:t>10/16/2015</a:t>
             </a:fld>
             <a:endParaRPr lang="en-US"/>
           </a:p>
@@ -4019,7 +4019,7 @@
           <a:p>
             <a:fld id="{CE56DC10-3561-4063-A6AF-C1CC7A41040A}" type="datetime1">
               <a:rPr lang="en-US" smtClean="0"/>
-              <a:t>10/5/2015</a:t>
+              <a:t>10/16/2015</a:t>
             </a:fld>
             <a:endParaRPr lang="en-US"/>
           </a:p>
@@ -4137,7 +4137,7 @@
           <a:p>
             <a:fld id="{2F7B77F5-1464-4F6B-92A8-64FC8A508293}" type="datetime1">
               <a:rPr lang="en-US" smtClean="0"/>
-              <a:t>10/5/2015</a:t>
+              <a:t>10/16/2015</a:t>
             </a:fld>
             <a:endParaRPr lang="en-US"/>
           </a:p>
@@ -4369,7 +4369,7 @@
           <a:p>
             <a:fld id="{02B3F677-983B-48DB-ADFD-63FE6CBC7FB2}" type="datetime1">
               <a:rPr lang="en-US" smtClean="0"/>
-              <a:t>10/5/2015</a:t>
+              <a:t>10/16/2015</a:t>
             </a:fld>
             <a:endParaRPr lang="en-US"/>
           </a:p>
@@ -5106,7 +5106,6 @@
               <a:rPr lang="en-US" dirty="0" smtClean="0"/>
               <a:t>You must write down a halting measure for each function that uses general recursion.</a:t>
             </a:r>
-            <a:endParaRPr lang="en-US" dirty="0" smtClean="0"/>
           </a:p>
           <a:p>
             <a:r>
@@ -5121,20 +5120,11 @@
               <a:rPr lang="en-US" dirty="0" smtClean="0"/>
               <a:t>.</a:t>
             </a:r>
-            <a:endParaRPr lang="en-US" dirty="0" smtClean="0"/>
-          </a:p>
-          <a:p>
-            <a:r>
-              <a:rPr lang="en-US" dirty="0" smtClean="0"/>
-              <a:t>If your function does </a:t>
-            </a:r>
-            <a:r>
-              <a:rPr lang="en-US" dirty="0" smtClean="0"/>
-              <a:t>not terminate on some input problems, </a:t>
-            </a:r>
-            <a:r>
-              <a:rPr lang="en-US" dirty="0" smtClean="0"/>
-              <a:t>you should write down a description of the inputs on which your program fails to halt.</a:t>
+          </a:p>
+          <a:p>
+            <a:r>
+              <a:rPr lang="en-US" dirty="0" smtClean="0"/>
+              <a:t>If your function does not terminate on some input problems, you should write down a description of the inputs on which your program fails to halt.</a:t>
             </a:r>
             <a:endParaRPr lang="en-US" i="1" dirty="0">
               <a:solidFill>
@@ -6154,11 +6144,7 @@
           <a:p>
             <a:r>
               <a:rPr lang="en-US" dirty="0" smtClean="0"/>
-              <a:t>-1 is a contract violation, so anything could happen</a:t>
-            </a:r>
-            <a:r>
-              <a:rPr lang="en-US" dirty="0" smtClean="0"/>
-              <a:t>.</a:t>
+              <a:t>-1 is a contract violation, so anything could happen.</a:t>
             </a:r>
           </a:p>
           <a:p>

</xml_diff>

<commit_message>
corrected filenames in Module 08 slides
</commit_message>
<xml_diff>
--- a/Slides/Lesson 8.2 Halting Measures.pptx
+++ b/Slides/Lesson 8.2 Halting Measures.pptx
@@ -246,7 +246,7 @@
             <a:fld id="{CF8F25F6-E1EF-4065-8525-42EDEBD9BD22}" type="datetimeFigureOut">
               <a:rPr lang="en-US" smtClean="0"/>
               <a:pPr/>
-              <a:t>10/5/2015</a:t>
+              <a:t>10/19/2015</a:t>
             </a:fld>
             <a:endParaRPr lang="en-US"/>
           </a:p>
@@ -1213,7 +1213,7 @@
           <a:p>
             <a:fld id="{2F1F79F5-7BEC-496A-AFC7-876E38F64D71}" type="datetime1">
               <a:rPr lang="en-US" smtClean="0"/>
-              <a:t>10/5/2015</a:t>
+              <a:t>10/19/2015</a:t>
             </a:fld>
             <a:endParaRPr lang="en-US"/>
           </a:p>
@@ -1315,7 +1315,7 @@
           <a:p>
             <a:fld id="{0A05703A-7669-4FEA-9056-25299B4D29D4}" type="datetime1">
               <a:rPr lang="en-US" smtClean="0"/>
-              <a:t>10/5/2015</a:t>
+              <a:t>10/19/2015</a:t>
             </a:fld>
             <a:endParaRPr lang="en-US"/>
           </a:p>
@@ -1592,7 +1592,7 @@
           <a:p>
             <a:fld id="{6E5077B5-BB57-49DB-88CA-226A139E5C01}" type="datetime1">
               <a:rPr lang="en-US" smtClean="0"/>
-              <a:t>10/5/2015</a:t>
+              <a:t>10/19/2015</a:t>
             </a:fld>
             <a:endParaRPr lang="en-US"/>
           </a:p>
@@ -1845,7 +1845,7 @@
           <a:p>
             <a:fld id="{C48D9447-CBD6-49A1-89FD-8512A8CF8999}" type="datetime1">
               <a:rPr lang="en-US" smtClean="0"/>
-              <a:t>10/5/2015</a:t>
+              <a:t>10/19/2015</a:t>
             </a:fld>
             <a:endParaRPr lang="en-US"/>
           </a:p>
@@ -2015,7 +2015,7 @@
           <a:p>
             <a:fld id="{A3639A2A-823D-48B7-9ACE-7FAF42870BA9}" type="datetime1">
               <a:rPr lang="en-US" smtClean="0"/>
-              <a:t>10/5/2015</a:t>
+              <a:t>10/19/2015</a:t>
             </a:fld>
             <a:endParaRPr lang="en-US"/>
           </a:p>
@@ -2195,7 +2195,7 @@
           <a:p>
             <a:fld id="{ED1B6996-82E9-463C-972C-7B56056E426C}" type="datetime1">
               <a:rPr lang="en-US" smtClean="0"/>
-              <a:t>10/5/2015</a:t>
+              <a:t>10/19/2015</a:t>
             </a:fld>
             <a:endParaRPr lang="en-US"/>
           </a:p>
@@ -2371,7 +2371,7 @@
           <a:p>
             <a:fld id="{E22ED4DA-448D-4BB1-B935-CC112220207B}" type="datetime1">
               <a:rPr lang="en-US" smtClean="0"/>
-              <a:t>10/5/2015</a:t>
+              <a:t>10/19/2015</a:t>
             </a:fld>
             <a:endParaRPr lang="en-US"/>
           </a:p>
@@ -2553,7 +2553,7 @@
           <a:p>
             <a:fld id="{E22ED4DA-448D-4BB1-B935-CC112220207B}" type="datetime1">
               <a:rPr lang="en-US" smtClean="0"/>
-              <a:t>10/5/2015</a:t>
+              <a:t>10/19/2015</a:t>
             </a:fld>
             <a:endParaRPr lang="en-US"/>
           </a:p>
@@ -2822,7 +2822,7 @@
           <a:p>
             <a:fld id="{FF5D65A6-AB94-4435-B0B7-3743215FA46C}" type="datetime1">
               <a:rPr lang="en-US" smtClean="0"/>
-              <a:t>10/5/2015</a:t>
+              <a:t>10/19/2015</a:t>
             </a:fld>
             <a:endParaRPr lang="en-US"/>
           </a:p>
@@ -3007,7 +3007,7 @@
           <a:p>
             <a:fld id="{FF5D65A6-AB94-4435-B0B7-3743215FA46C}" type="datetime1">
               <a:rPr lang="en-US" smtClean="0"/>
-              <a:t>10/5/2015</a:t>
+              <a:t>10/19/2015</a:t>
             </a:fld>
             <a:endParaRPr lang="en-US"/>
           </a:p>
@@ -3309,7 +3309,7 @@
           <a:p>
             <a:fld id="{7C193DC4-6EF0-48C9-B29C-616106A645E1}" type="datetime1">
               <a:rPr lang="en-US" smtClean="0"/>
-              <a:t>10/5/2015</a:t>
+              <a:t>10/19/2015</a:t>
             </a:fld>
             <a:endParaRPr lang="en-US"/>
           </a:p>
@@ -3597,7 +3597,7 @@
           <a:p>
             <a:fld id="{5D1846AD-9252-4647-9435-4C2AC365653A}" type="datetime1">
               <a:rPr lang="en-US" smtClean="0"/>
-              <a:t>10/5/2015</a:t>
+              <a:t>10/19/2015</a:t>
             </a:fld>
             <a:endParaRPr lang="en-US"/>
           </a:p>
@@ -4019,7 +4019,7 @@
           <a:p>
             <a:fld id="{CE56DC10-3561-4063-A6AF-C1CC7A41040A}" type="datetime1">
               <a:rPr lang="en-US" smtClean="0"/>
-              <a:t>10/5/2015</a:t>
+              <a:t>10/19/2015</a:t>
             </a:fld>
             <a:endParaRPr lang="en-US"/>
           </a:p>
@@ -4137,7 +4137,7 @@
           <a:p>
             <a:fld id="{2F7B77F5-1464-4F6B-92A8-64FC8A508293}" type="datetime1">
               <a:rPr lang="en-US" smtClean="0"/>
-              <a:t>10/5/2015</a:t>
+              <a:t>10/19/2015</a:t>
             </a:fld>
             <a:endParaRPr lang="en-US"/>
           </a:p>
@@ -4369,7 +4369,7 @@
           <a:p>
             <a:fld id="{02B3F677-983B-48DB-ADFD-63FE6CBC7FB2}" type="datetime1">
               <a:rPr lang="en-US" smtClean="0"/>
-              <a:t>10/5/2015</a:t>
+              <a:t>10/19/2015</a:t>
             </a:fld>
             <a:endParaRPr lang="en-US"/>
           </a:p>
@@ -5106,7 +5106,6 @@
               <a:rPr lang="en-US" dirty="0" smtClean="0"/>
               <a:t>You must write down a halting measure for each function that uses general recursion.</a:t>
             </a:r>
-            <a:endParaRPr lang="en-US" dirty="0" smtClean="0"/>
           </a:p>
           <a:p>
             <a:r>
@@ -5121,20 +5120,11 @@
               <a:rPr lang="en-US" dirty="0" smtClean="0"/>
               <a:t>.</a:t>
             </a:r>
-            <a:endParaRPr lang="en-US" dirty="0" smtClean="0"/>
-          </a:p>
-          <a:p>
-            <a:r>
-              <a:rPr lang="en-US" dirty="0" smtClean="0"/>
-              <a:t>If your function does </a:t>
-            </a:r>
-            <a:r>
-              <a:rPr lang="en-US" dirty="0" smtClean="0"/>
-              <a:t>not terminate on some input problems, </a:t>
-            </a:r>
-            <a:r>
-              <a:rPr lang="en-US" dirty="0" smtClean="0"/>
-              <a:t>you should write down a description of the inputs on which your program fails to halt.</a:t>
+          </a:p>
+          <a:p>
+            <a:r>
+              <a:rPr lang="en-US" dirty="0" smtClean="0"/>
+              <a:t>If your function does not terminate on some input problems, you should write down a description of the inputs on which your program fails to halt.</a:t>
             </a:r>
             <a:endParaRPr lang="en-US" i="1" dirty="0">
               <a:solidFill>
@@ -6154,11 +6144,7 @@
           <a:p>
             <a:r>
               <a:rPr lang="en-US" dirty="0" smtClean="0"/>
-              <a:t>-1 is a contract violation, so anything could happen</a:t>
-            </a:r>
-            <a:r>
-              <a:rPr lang="en-US" dirty="0" smtClean="0"/>
-              <a:t>.</a:t>
+              <a:t>-1 is a contract violation, so anything could happen.</a:t>
             </a:r>
           </a:p>
           <a:p>
@@ -7432,21 +7418,33 @@
           <a:p>
             <a:r>
               <a:rPr lang="en-US" dirty="0"/>
-              <a:t>Study the example of general recursion in </a:t>
-            </a:r>
-            <a:r>
-              <a:rPr lang="en-US" dirty="0" smtClean="0"/>
-              <a:t>08-3-binary-search.rkt, 08-4-fib.rkt, and 08-5-function-sum.rkt in the Examples folder.</a:t>
-            </a:r>
-          </a:p>
-          <a:p>
-            <a:r>
-              <a:rPr lang="en-US" smtClean="0"/>
-              <a:t>If </a:t>
-            </a:r>
-            <a:r>
-              <a:rPr lang="en-US" dirty="0" smtClean="0"/>
-              <a:t>you have questions about this lesson, ask them on the Discussion Board</a:t>
+              <a:t>Study the </a:t>
+            </a:r>
+            <a:r>
+              <a:rPr lang="en-US" dirty="0" smtClean="0"/>
+              <a:t>examples </a:t>
+            </a:r>
+            <a:r>
+              <a:rPr lang="en-US" dirty="0"/>
+              <a:t>of general recursion in </a:t>
+            </a:r>
+            <a:r>
+              <a:rPr lang="en-US" dirty="0" smtClean="0"/>
+              <a:t>08-1-decode.rkt, 08-2-merge-sort.rkt</a:t>
+            </a:r>
+            <a:r>
+              <a:rPr lang="en-US" smtClean="0"/>
+              <a:t>, and  08-3-fib.rkt in </a:t>
+            </a:r>
+            <a:r>
+              <a:rPr lang="en-US" dirty="0" smtClean="0"/>
+              <a:t>the Examples folder.</a:t>
+            </a:r>
+          </a:p>
+          <a:p>
+            <a:r>
+              <a:rPr lang="en-US" dirty="0" smtClean="0"/>
+              <a:t>If you have questions about this lesson, ask them on the Discussion Board</a:t>
             </a:r>
           </a:p>
           <a:p>

</xml_diff>

<commit_message>
added example for lect 7
</commit_message>
<xml_diff>
--- a/Slides/Lesson 8.2 Halting Measures.pptx
+++ b/Slides/Lesson 8.2 Halting Measures.pptx
@@ -246,7 +246,7 @@
             <a:fld id="{CF8F25F6-E1EF-4065-8525-42EDEBD9BD22}" type="datetimeFigureOut">
               <a:rPr lang="en-US" smtClean="0"/>
               <a:pPr/>
-              <a:t>10/19/2015</a:t>
+              <a:t>10/26/2015</a:t>
             </a:fld>
             <a:endParaRPr lang="en-US"/>
           </a:p>
@@ -1213,7 +1213,7 @@
           <a:p>
             <a:fld id="{2F1F79F5-7BEC-496A-AFC7-876E38F64D71}" type="datetime1">
               <a:rPr lang="en-US" smtClean="0"/>
-              <a:t>10/19/2015</a:t>
+              <a:t>10/26/2015</a:t>
             </a:fld>
             <a:endParaRPr lang="en-US"/>
           </a:p>
@@ -1315,7 +1315,7 @@
           <a:p>
             <a:fld id="{0A05703A-7669-4FEA-9056-25299B4D29D4}" type="datetime1">
               <a:rPr lang="en-US" smtClean="0"/>
-              <a:t>10/19/2015</a:t>
+              <a:t>10/26/2015</a:t>
             </a:fld>
             <a:endParaRPr lang="en-US"/>
           </a:p>
@@ -1592,7 +1592,7 @@
           <a:p>
             <a:fld id="{6E5077B5-BB57-49DB-88CA-226A139E5C01}" type="datetime1">
               <a:rPr lang="en-US" smtClean="0"/>
-              <a:t>10/19/2015</a:t>
+              <a:t>10/26/2015</a:t>
             </a:fld>
             <a:endParaRPr lang="en-US"/>
           </a:p>
@@ -1845,7 +1845,7 @@
           <a:p>
             <a:fld id="{C48D9447-CBD6-49A1-89FD-8512A8CF8999}" type="datetime1">
               <a:rPr lang="en-US" smtClean="0"/>
-              <a:t>10/19/2015</a:t>
+              <a:t>10/26/2015</a:t>
             </a:fld>
             <a:endParaRPr lang="en-US"/>
           </a:p>
@@ -2015,7 +2015,7 @@
           <a:p>
             <a:fld id="{A3639A2A-823D-48B7-9ACE-7FAF42870BA9}" type="datetime1">
               <a:rPr lang="en-US" smtClean="0"/>
-              <a:t>10/19/2015</a:t>
+              <a:t>10/26/2015</a:t>
             </a:fld>
             <a:endParaRPr lang="en-US"/>
           </a:p>
@@ -2195,7 +2195,7 @@
           <a:p>
             <a:fld id="{ED1B6996-82E9-463C-972C-7B56056E426C}" type="datetime1">
               <a:rPr lang="en-US" smtClean="0"/>
-              <a:t>10/19/2015</a:t>
+              <a:t>10/26/2015</a:t>
             </a:fld>
             <a:endParaRPr lang="en-US"/>
           </a:p>
@@ -2371,7 +2371,7 @@
           <a:p>
             <a:fld id="{E22ED4DA-448D-4BB1-B935-CC112220207B}" type="datetime1">
               <a:rPr lang="en-US" smtClean="0"/>
-              <a:t>10/19/2015</a:t>
+              <a:t>10/26/2015</a:t>
             </a:fld>
             <a:endParaRPr lang="en-US"/>
           </a:p>
@@ -2553,7 +2553,7 @@
           <a:p>
             <a:fld id="{E22ED4DA-448D-4BB1-B935-CC112220207B}" type="datetime1">
               <a:rPr lang="en-US" smtClean="0"/>
-              <a:t>10/19/2015</a:t>
+              <a:t>10/26/2015</a:t>
             </a:fld>
             <a:endParaRPr lang="en-US"/>
           </a:p>
@@ -2822,7 +2822,7 @@
           <a:p>
             <a:fld id="{FF5D65A6-AB94-4435-B0B7-3743215FA46C}" type="datetime1">
               <a:rPr lang="en-US" smtClean="0"/>
-              <a:t>10/19/2015</a:t>
+              <a:t>10/26/2015</a:t>
             </a:fld>
             <a:endParaRPr lang="en-US"/>
           </a:p>
@@ -3007,7 +3007,7 @@
           <a:p>
             <a:fld id="{FF5D65A6-AB94-4435-B0B7-3743215FA46C}" type="datetime1">
               <a:rPr lang="en-US" smtClean="0"/>
-              <a:t>10/19/2015</a:t>
+              <a:t>10/26/2015</a:t>
             </a:fld>
             <a:endParaRPr lang="en-US"/>
           </a:p>
@@ -3309,7 +3309,7 @@
           <a:p>
             <a:fld id="{7C193DC4-6EF0-48C9-B29C-616106A645E1}" type="datetime1">
               <a:rPr lang="en-US" smtClean="0"/>
-              <a:t>10/19/2015</a:t>
+              <a:t>10/26/2015</a:t>
             </a:fld>
             <a:endParaRPr lang="en-US"/>
           </a:p>
@@ -3597,7 +3597,7 @@
           <a:p>
             <a:fld id="{5D1846AD-9252-4647-9435-4C2AC365653A}" type="datetime1">
               <a:rPr lang="en-US" smtClean="0"/>
-              <a:t>10/19/2015</a:t>
+              <a:t>10/26/2015</a:t>
             </a:fld>
             <a:endParaRPr lang="en-US"/>
           </a:p>
@@ -4019,7 +4019,7 @@
           <a:p>
             <a:fld id="{CE56DC10-3561-4063-A6AF-C1CC7A41040A}" type="datetime1">
               <a:rPr lang="en-US" smtClean="0"/>
-              <a:t>10/19/2015</a:t>
+              <a:t>10/26/2015</a:t>
             </a:fld>
             <a:endParaRPr lang="en-US"/>
           </a:p>
@@ -4137,7 +4137,7 @@
           <a:p>
             <a:fld id="{2F7B77F5-1464-4F6B-92A8-64FC8A508293}" type="datetime1">
               <a:rPr lang="en-US" smtClean="0"/>
-              <a:t>10/19/2015</a:t>
+              <a:t>10/26/2015</a:t>
             </a:fld>
             <a:endParaRPr lang="en-US"/>
           </a:p>
@@ -4369,7 +4369,7 @@
           <a:p>
             <a:fld id="{02B3F677-983B-48DB-ADFD-63FE6CBC7FB2}" type="datetime1">
               <a:rPr lang="en-US" smtClean="0"/>
-              <a:t>10/19/2015</a:t>
+              <a:t>10/26/2015</a:t>
             </a:fld>
             <a:endParaRPr lang="en-US"/>
           </a:p>
@@ -5849,11 +5849,51 @@
           <a:p>
             <a:pPr lvl="1"/>
             <a:r>
+              <a:rPr lang="en-US" dirty="0" smtClean="0">
+                <a:solidFill>
+                  <a:srgbClr val="FF0000"/>
+                </a:solidFill>
+              </a:rPr>
+              <a:t>At each recursive  call, </a:t>
+            </a:r>
+            <a:r>
               <a:rPr lang="en-US" b="1" dirty="0" smtClean="0">
                 <a:solidFill>
                   <a:srgbClr val="FF0000"/>
                 </a:solidFill>
               </a:rPr>
+              <a:t>n-1</a:t>
+            </a:r>
+            <a:r>
+              <a:rPr lang="en-US" dirty="0" smtClean="0">
+                <a:solidFill>
+                  <a:srgbClr val="FF0000"/>
+                </a:solidFill>
+              </a:rPr>
+              <a:t>  and </a:t>
+            </a:r>
+            <a:r>
+              <a:rPr lang="en-US" b="1" dirty="0" smtClean="0">
+                <a:solidFill>
+                  <a:srgbClr val="FF0000"/>
+                </a:solidFill>
+              </a:rPr>
+              <a:t>n-2 </a:t>
+            </a:r>
+            <a:r>
+              <a:rPr lang="en-US" dirty="0" smtClean="0">
+                <a:solidFill>
+                  <a:srgbClr val="FF0000"/>
+                </a:solidFill>
+              </a:rPr>
+              <a:t>are both non-negative  integers,  and each is strictly smaller than </a:t>
+            </a:r>
+            <a:r>
+              <a:rPr lang="en-US" b="1" dirty="0" smtClean="0">
+                <a:solidFill>
+                  <a:srgbClr val="FF0000"/>
+                </a:solidFill>
+              </a:rPr>
               <a:t>n</a:t>
             </a:r>
             <a:r>
@@ -5862,7 +5902,15 @@
                   <a:srgbClr val="FF0000"/>
                 </a:solidFill>
               </a:rPr>
-              <a:t> decreases at each recursive call</a:t>
+              <a:t> </a:t>
+            </a:r>
+            <a:r>
+              <a:rPr lang="en-US" dirty="0" smtClean="0">
+                <a:solidFill>
+                  <a:srgbClr val="FF0000"/>
+                </a:solidFill>
+              </a:rPr>
+              <a:t>decreases at each recursive call</a:t>
             </a:r>
           </a:p>
           <a:p>
@@ -6726,8 +6774,9 @@
           <a:p>
             <a:r>
               <a:rPr lang="en-US" dirty="0"/>
-              <a:t>You can usually tell just from the function definition whether it is structural or general recursion.  </a:t>
-            </a:r>
+              <a:t>You can usually tell just from the function definition whether it is structural or general recursion. </a:t>
+            </a:r>
+            <a:endParaRPr lang="en-US" dirty="0" smtClean="0"/>
           </a:p>
           <a:p>
             <a:endParaRPr lang="en-US" dirty="0"/>

</xml_diff>

<commit_message>
working on Lessons 8.2-8.4
</commit_message>
<xml_diff>
--- a/Slides/Lesson 8.2 Halting Measures.pptx
+++ b/Slides/Lesson 8.2 Halting Measures.pptx
@@ -246,7 +246,7 @@
             <a:fld id="{CF8F25F6-E1EF-4065-8525-42EDEBD9BD22}" type="datetimeFigureOut">
               <a:rPr lang="en-US" smtClean="0"/>
               <a:pPr/>
-              <a:t>10/29/2015</a:t>
+              <a:t>10/23/2016</a:t>
             </a:fld>
             <a:endParaRPr lang="en-US"/>
           </a:p>
@@ -312,38 +312,37 @@
           <a:p>
             <a:pPr lvl="0"/>
             <a:r>
-              <a:rPr lang="en-US" smtClean="0"/>
+              <a:rPr lang="en-US"/>
               <a:t>Click to edit Master text styles</a:t>
             </a:r>
           </a:p>
           <a:p>
             <a:pPr lvl="1"/>
             <a:r>
-              <a:rPr lang="en-US" smtClean="0"/>
+              <a:rPr lang="en-US"/>
               <a:t>Second level</a:t>
             </a:r>
           </a:p>
           <a:p>
             <a:pPr lvl="2"/>
             <a:r>
-              <a:rPr lang="en-US" smtClean="0"/>
+              <a:rPr lang="en-US"/>
               <a:t>Third level</a:t>
             </a:r>
           </a:p>
           <a:p>
             <a:pPr lvl="3"/>
             <a:r>
-              <a:rPr lang="en-US" smtClean="0"/>
+              <a:rPr lang="en-US"/>
               <a:t>Fourth level</a:t>
             </a:r>
           </a:p>
           <a:p>
             <a:pPr lvl="4"/>
             <a:r>
-              <a:rPr lang="en-US" smtClean="0"/>
+              <a:rPr lang="en-US"/>
               <a:t>Fifth level</a:t>
             </a:r>
-            <a:endParaRPr lang="en-US"/>
           </a:p>
         </p:txBody>
       </p:sp>
@@ -563,7 +562,7 @@
           </a:bodyPr>
           <a:lstStyle/>
           <a:p>
-            <a:endParaRPr lang="en-US" dirty="0" smtClean="0"/>
+            <a:endParaRPr lang="en-US" dirty="0"/>
           </a:p>
         </p:txBody>
       </p:sp>
@@ -988,7 +987,7 @@
           <a:bodyPr/>
           <a:lstStyle/>
           <a:p>
-            <a:endParaRPr lang="en-US" dirty="0" smtClean="0"/>
+            <a:endParaRPr lang="en-US" dirty="0"/>
           </a:p>
           <a:p>
             <a:endParaRPr lang="en-US" dirty="0"/>
@@ -1070,10 +1069,9 @@
           <a:lstStyle/>
           <a:p>
             <a:r>
-              <a:rPr lang="en-US" smtClean="0"/>
+              <a:rPr lang="en-US"/>
               <a:t>Click to edit Master title style</a:t>
             </a:r>
-            <a:endParaRPr lang="en-US"/>
           </a:p>
         </p:txBody>
       </p:sp>
@@ -1189,10 +1187,9 @@
           </a:lstStyle>
           <a:p>
             <a:r>
-              <a:rPr lang="en-US" smtClean="0"/>
+              <a:rPr lang="en-US"/>
               <a:t>Click to edit Master subtitle style</a:t>
             </a:r>
-            <a:endParaRPr lang="en-US"/>
           </a:p>
         </p:txBody>
       </p:sp>
@@ -1213,7 +1210,7 @@
           <a:p>
             <a:fld id="{2F1F79F5-7BEC-496A-AFC7-876E38F64D71}" type="datetime1">
               <a:rPr lang="en-US" smtClean="0"/>
-              <a:t>10/29/2015</a:t>
+              <a:t>10/23/2016</a:t>
             </a:fld>
             <a:endParaRPr lang="en-US"/>
           </a:p>
@@ -1271,13 +1268,6 @@
   <p:clrMapOvr>
     <a:masterClrMapping/>
   </p:clrMapOvr>
-  <p:timing>
-    <p:tnLst>
-      <p:par>
-        <p:cTn id="1" dur="indefinite" restart="never" nodeType="tmRoot"/>
-      </p:par>
-    </p:tnLst>
-  </p:timing>
 </p:sldLayout>
 </file>
 
@@ -1315,7 +1305,7 @@
           <a:p>
             <a:fld id="{0A05703A-7669-4FEA-9056-25299B4D29D4}" type="datetime1">
               <a:rPr lang="en-US" smtClean="0"/>
-              <a:t>10/29/2015</a:t>
+              <a:t>10/23/2016</a:t>
             </a:fld>
             <a:endParaRPr lang="en-US"/>
           </a:p>
@@ -1418,10 +1408,9 @@
           </a:lstStyle>
           <a:p>
             <a:r>
-              <a:rPr lang="en-US" smtClean="0"/>
+              <a:rPr lang="en-US"/>
               <a:t>Click to edit Master title style</a:t>
             </a:r>
-            <a:endParaRPr lang="en-US"/>
           </a:p>
         </p:txBody>
       </p:sp>
@@ -1475,38 +1464,37 @@
           <a:p>
             <a:pPr lvl="0"/>
             <a:r>
-              <a:rPr lang="en-US" smtClean="0"/>
+              <a:rPr lang="en-US"/>
               <a:t>Click to edit Master text styles</a:t>
             </a:r>
           </a:p>
           <a:p>
             <a:pPr lvl="1"/>
             <a:r>
-              <a:rPr lang="en-US" smtClean="0"/>
+              <a:rPr lang="en-US"/>
               <a:t>Second level</a:t>
             </a:r>
           </a:p>
           <a:p>
             <a:pPr lvl="2"/>
             <a:r>
-              <a:rPr lang="en-US" smtClean="0"/>
+              <a:rPr lang="en-US"/>
               <a:t>Third level</a:t>
             </a:r>
           </a:p>
           <a:p>
             <a:pPr lvl="3"/>
             <a:r>
-              <a:rPr lang="en-US" smtClean="0"/>
+              <a:rPr lang="en-US"/>
               <a:t>Fourth level</a:t>
             </a:r>
           </a:p>
           <a:p>
             <a:pPr lvl="4"/>
             <a:r>
-              <a:rPr lang="en-US" smtClean="0"/>
+              <a:rPr lang="en-US"/>
               <a:t>Fifth level</a:t>
             </a:r>
-            <a:endParaRPr lang="en-US"/>
           </a:p>
         </p:txBody>
       </p:sp>
@@ -1569,7 +1557,7 @@
           <a:p>
             <a:pPr lvl="0"/>
             <a:r>
-              <a:rPr lang="en-US" smtClean="0"/>
+              <a:rPr lang="en-US"/>
               <a:t>Click to edit Master text styles</a:t>
             </a:r>
           </a:p>
@@ -1592,7 +1580,7 @@
           <a:p>
             <a:fld id="{6E5077B5-BB57-49DB-88CA-226A139E5C01}" type="datetime1">
               <a:rPr lang="en-US" smtClean="0"/>
-              <a:t>10/29/2015</a:t>
+              <a:t>10/23/2016</a:t>
             </a:fld>
             <a:endParaRPr lang="en-US"/>
           </a:p>
@@ -1695,10 +1683,9 @@
           </a:lstStyle>
           <a:p>
             <a:r>
-              <a:rPr lang="en-US" smtClean="0"/>
+              <a:rPr lang="en-US"/>
               <a:t>Click to edit Master title style</a:t>
             </a:r>
-            <a:endParaRPr lang="en-US"/>
           </a:p>
         </p:txBody>
       </p:sp>
@@ -1822,7 +1809,7 @@
           <a:p>
             <a:pPr lvl="0"/>
             <a:r>
-              <a:rPr lang="en-US" smtClean="0"/>
+              <a:rPr lang="en-US"/>
               <a:t>Click to edit Master text styles</a:t>
             </a:r>
           </a:p>
@@ -1845,7 +1832,7 @@
           <a:p>
             <a:fld id="{C48D9447-CBD6-49A1-89FD-8512A8CF8999}" type="datetime1">
               <a:rPr lang="en-US" smtClean="0"/>
-              <a:t>10/29/2015</a:t>
+              <a:t>10/23/2016</a:t>
             </a:fld>
             <a:endParaRPr lang="en-US"/>
           </a:p>
@@ -1939,10 +1926,9 @@
           <a:lstStyle/>
           <a:p>
             <a:r>
-              <a:rPr lang="en-US" smtClean="0"/>
+              <a:rPr lang="en-US"/>
               <a:t>Click to edit Master title style</a:t>
             </a:r>
-            <a:endParaRPr lang="en-US"/>
           </a:p>
         </p:txBody>
       </p:sp>
@@ -1963,38 +1949,37 @@
           <a:p>
             <a:pPr lvl="0"/>
             <a:r>
-              <a:rPr lang="en-US" smtClean="0"/>
+              <a:rPr lang="en-US"/>
               <a:t>Click to edit Master text styles</a:t>
             </a:r>
           </a:p>
           <a:p>
             <a:pPr lvl="1"/>
             <a:r>
-              <a:rPr lang="en-US" smtClean="0"/>
+              <a:rPr lang="en-US"/>
               <a:t>Second level</a:t>
             </a:r>
           </a:p>
           <a:p>
             <a:pPr lvl="2"/>
             <a:r>
-              <a:rPr lang="en-US" smtClean="0"/>
+              <a:rPr lang="en-US"/>
               <a:t>Third level</a:t>
             </a:r>
           </a:p>
           <a:p>
             <a:pPr lvl="3"/>
             <a:r>
-              <a:rPr lang="en-US" smtClean="0"/>
+              <a:rPr lang="en-US"/>
               <a:t>Fourth level</a:t>
             </a:r>
           </a:p>
           <a:p>
             <a:pPr lvl="4"/>
             <a:r>
-              <a:rPr lang="en-US" smtClean="0"/>
+              <a:rPr lang="en-US"/>
               <a:t>Fifth level</a:t>
             </a:r>
-            <a:endParaRPr lang="en-US"/>
           </a:p>
         </p:txBody>
       </p:sp>
@@ -2015,7 +2000,7 @@
           <a:p>
             <a:fld id="{A3639A2A-823D-48B7-9ACE-7FAF42870BA9}" type="datetime1">
               <a:rPr lang="en-US" smtClean="0"/>
-              <a:t>10/29/2015</a:t>
+              <a:t>10/23/2016</a:t>
             </a:fld>
             <a:endParaRPr lang="en-US"/>
           </a:p>
@@ -2114,10 +2099,9 @@
           <a:lstStyle/>
           <a:p>
             <a:r>
-              <a:rPr lang="en-US" smtClean="0"/>
+              <a:rPr lang="en-US"/>
               <a:t>Click to edit Master title style</a:t>
             </a:r>
-            <a:endParaRPr lang="en-US"/>
           </a:p>
         </p:txBody>
       </p:sp>
@@ -2143,38 +2127,37 @@
           <a:p>
             <a:pPr lvl="0"/>
             <a:r>
-              <a:rPr lang="en-US" smtClean="0"/>
+              <a:rPr lang="en-US"/>
               <a:t>Click to edit Master text styles</a:t>
             </a:r>
           </a:p>
           <a:p>
             <a:pPr lvl="1"/>
             <a:r>
-              <a:rPr lang="en-US" smtClean="0"/>
+              <a:rPr lang="en-US"/>
               <a:t>Second level</a:t>
             </a:r>
           </a:p>
           <a:p>
             <a:pPr lvl="2"/>
             <a:r>
-              <a:rPr lang="en-US" smtClean="0"/>
+              <a:rPr lang="en-US"/>
               <a:t>Third level</a:t>
             </a:r>
           </a:p>
           <a:p>
             <a:pPr lvl="3"/>
             <a:r>
-              <a:rPr lang="en-US" smtClean="0"/>
+              <a:rPr lang="en-US"/>
               <a:t>Fourth level</a:t>
             </a:r>
           </a:p>
           <a:p>
             <a:pPr lvl="4"/>
             <a:r>
-              <a:rPr lang="en-US" smtClean="0"/>
+              <a:rPr lang="en-US"/>
               <a:t>Fifth level</a:t>
             </a:r>
-            <a:endParaRPr lang="en-US"/>
           </a:p>
         </p:txBody>
       </p:sp>
@@ -2195,7 +2178,7 @@
           <a:p>
             <a:fld id="{ED1B6996-82E9-463C-972C-7B56056E426C}" type="datetime1">
               <a:rPr lang="en-US" smtClean="0"/>
-              <a:t>10/29/2015</a:t>
+              <a:t>10/23/2016</a:t>
             </a:fld>
             <a:endParaRPr lang="en-US"/>
           </a:p>
@@ -2295,10 +2278,9 @@
           <a:lstStyle/>
           <a:p>
             <a:r>
-              <a:rPr lang="en-US" dirty="0" smtClean="0"/>
+              <a:rPr lang="en-US" dirty="0"/>
               <a:t>Click to edit Master title style</a:t>
             </a:r>
-            <a:endParaRPr lang="en-US" dirty="0"/>
           </a:p>
         </p:txBody>
       </p:sp>
@@ -2319,38 +2301,37 @@
           <a:p>
             <a:pPr lvl="0"/>
             <a:r>
-              <a:rPr lang="en-US" smtClean="0"/>
+              <a:rPr lang="en-US"/>
               <a:t>Click to edit Master text styles</a:t>
             </a:r>
           </a:p>
           <a:p>
             <a:pPr lvl="1"/>
             <a:r>
-              <a:rPr lang="en-US" smtClean="0"/>
+              <a:rPr lang="en-US"/>
               <a:t>Second level</a:t>
             </a:r>
           </a:p>
           <a:p>
             <a:pPr lvl="2"/>
             <a:r>
-              <a:rPr lang="en-US" smtClean="0"/>
+              <a:rPr lang="en-US"/>
               <a:t>Third level</a:t>
             </a:r>
           </a:p>
           <a:p>
             <a:pPr lvl="3"/>
             <a:r>
-              <a:rPr lang="en-US" smtClean="0"/>
+              <a:rPr lang="en-US"/>
               <a:t>Fourth level</a:t>
             </a:r>
           </a:p>
           <a:p>
             <a:pPr lvl="4"/>
             <a:r>
-              <a:rPr lang="en-US" smtClean="0"/>
+              <a:rPr lang="en-US"/>
               <a:t>Fifth level</a:t>
             </a:r>
-            <a:endParaRPr lang="en-US"/>
           </a:p>
         </p:txBody>
       </p:sp>
@@ -2371,7 +2352,7 @@
           <a:p>
             <a:fld id="{E22ED4DA-448D-4BB1-B935-CC112220207B}" type="datetime1">
               <a:rPr lang="en-US" smtClean="0"/>
-              <a:t>10/29/2015</a:t>
+              <a:t>10/23/2016</a:t>
             </a:fld>
             <a:endParaRPr lang="en-US"/>
           </a:p>
@@ -2429,13 +2410,6 @@
   <p:clrMapOvr>
     <a:masterClrMapping/>
   </p:clrMapOvr>
-  <p:timing>
-    <p:tnLst>
-      <p:par>
-        <p:cTn id="1" dur="indefinite" restart="never" nodeType="tmRoot"/>
-      </p:par>
-    </p:tnLst>
-  </p:timing>
 </p:sldLayout>
 </file>
 
@@ -2472,10 +2446,9 @@
           <a:lstStyle/>
           <a:p>
             <a:r>
-              <a:rPr lang="en-US" smtClean="0"/>
+              <a:rPr lang="en-US"/>
               <a:t>Click to edit Master title style</a:t>
             </a:r>
-            <a:endParaRPr lang="en-US"/>
           </a:p>
         </p:txBody>
       </p:sp>
@@ -2501,38 +2474,37 @@
           <a:p>
             <a:pPr lvl="0"/>
             <a:r>
-              <a:rPr lang="en-US" dirty="0" smtClean="0"/>
+              <a:rPr lang="en-US" dirty="0"/>
               <a:t>Click to edit Master text styles</a:t>
             </a:r>
           </a:p>
           <a:p>
             <a:pPr lvl="1"/>
             <a:r>
-              <a:rPr lang="en-US" dirty="0" smtClean="0"/>
+              <a:rPr lang="en-US" dirty="0"/>
               <a:t>Second level</a:t>
             </a:r>
           </a:p>
           <a:p>
             <a:pPr lvl="2"/>
             <a:r>
-              <a:rPr lang="en-US" dirty="0" smtClean="0"/>
+              <a:rPr lang="en-US" dirty="0"/>
               <a:t>Third level</a:t>
             </a:r>
           </a:p>
           <a:p>
             <a:pPr lvl="3"/>
             <a:r>
-              <a:rPr lang="en-US" dirty="0" smtClean="0"/>
+              <a:rPr lang="en-US" dirty="0"/>
               <a:t>Fourth level</a:t>
             </a:r>
           </a:p>
           <a:p>
             <a:pPr lvl="4"/>
             <a:r>
-              <a:rPr lang="en-US" dirty="0" smtClean="0"/>
+              <a:rPr lang="en-US" dirty="0"/>
               <a:t>Fifth level</a:t>
             </a:r>
-            <a:endParaRPr lang="en-US" dirty="0"/>
           </a:p>
         </p:txBody>
       </p:sp>
@@ -2553,7 +2525,7 @@
           <a:p>
             <a:fld id="{E22ED4DA-448D-4BB1-B935-CC112220207B}" type="datetime1">
               <a:rPr lang="en-US" smtClean="0"/>
-              <a:t>10/29/2015</a:t>
+              <a:t>10/23/2016</a:t>
             </a:fld>
             <a:endParaRPr lang="en-US"/>
           </a:p>
@@ -2643,7 +2615,7 @@
           <a:lstStyle/>
           <a:p>
             <a:pPr algn="ctr"/>
-            <a:endParaRPr lang="en-US" dirty="0" smtClean="0">
+            <a:endParaRPr lang="en-US" dirty="0">
               <a:solidFill>
                 <a:schemeClr val="tx1"/>
               </a:solidFill>
@@ -2674,11 +2646,11 @@
           <a:lstStyle/>
           <a:p>
             <a:r>
-              <a:rPr lang="en-US" dirty="0" smtClean="0"/>
+              <a:rPr lang="en-US" dirty="0"/>
               <a:t>Resize video to this</a:t>
             </a:r>
             <a:r>
-              <a:rPr lang="en-US" baseline="0" dirty="0" smtClean="0"/>
+              <a:rPr lang="en-US" baseline="0" dirty="0"/>
               <a:t> box.</a:t>
             </a:r>
             <a:endParaRPr lang="en-US" dirty="0"/>
@@ -2695,13 +2667,6 @@
   <p:clrMapOvr>
     <a:masterClrMapping/>
   </p:clrMapOvr>
-  <p:timing>
-    <p:tnLst>
-      <p:par>
-        <p:cTn id="1" dur="indefinite" restart="never" nodeType="tmRoot"/>
-      </p:par>
-    </p:tnLst>
-  </p:timing>
 </p:sldLayout>
 </file>
 
@@ -2738,10 +2703,9 @@
           <a:lstStyle/>
           <a:p>
             <a:r>
-              <a:rPr lang="en-US" smtClean="0"/>
+              <a:rPr lang="en-US"/>
               <a:t>Click to edit Master title style</a:t>
             </a:r>
-            <a:endParaRPr lang="en-US"/>
           </a:p>
         </p:txBody>
       </p:sp>
@@ -2770,38 +2734,37 @@
           <a:p>
             <a:pPr lvl="0"/>
             <a:r>
-              <a:rPr lang="en-US" dirty="0" smtClean="0"/>
+              <a:rPr lang="en-US" dirty="0"/>
               <a:t>Click to edit Master text styles</a:t>
             </a:r>
           </a:p>
           <a:p>
             <a:pPr lvl="1"/>
             <a:r>
-              <a:rPr lang="en-US" dirty="0" smtClean="0"/>
+              <a:rPr lang="en-US" dirty="0"/>
               <a:t>Second level</a:t>
             </a:r>
           </a:p>
           <a:p>
             <a:pPr lvl="2"/>
             <a:r>
-              <a:rPr lang="en-US" dirty="0" smtClean="0"/>
+              <a:rPr lang="en-US" dirty="0"/>
               <a:t>Third level</a:t>
             </a:r>
           </a:p>
           <a:p>
             <a:pPr lvl="3"/>
             <a:r>
-              <a:rPr lang="en-US" dirty="0" smtClean="0"/>
+              <a:rPr lang="en-US" dirty="0"/>
               <a:t>Fourth level</a:t>
             </a:r>
           </a:p>
           <a:p>
             <a:pPr lvl="4"/>
             <a:r>
-              <a:rPr lang="en-US" dirty="0" smtClean="0"/>
+              <a:rPr lang="en-US" dirty="0"/>
               <a:t>Fifth level</a:t>
             </a:r>
-            <a:endParaRPr lang="en-US" dirty="0"/>
           </a:p>
         </p:txBody>
       </p:sp>
@@ -2822,7 +2785,7 @@
           <a:p>
             <a:fld id="{FF5D65A6-AB94-4435-B0B7-3743215FA46C}" type="datetime1">
               <a:rPr lang="en-US" smtClean="0"/>
-              <a:t>10/29/2015</a:t>
+              <a:t>10/23/2016</a:t>
             </a:fld>
             <a:endParaRPr lang="en-US"/>
           </a:p>
@@ -2880,13 +2843,6 @@
   <p:clrMapOvr>
     <a:masterClrMapping/>
   </p:clrMapOvr>
-  <p:timing>
-    <p:tnLst>
-      <p:par>
-        <p:cTn id="1" dur="indefinite" restart="never" nodeType="tmRoot"/>
-      </p:par>
-    </p:tnLst>
-  </p:timing>
 </p:sldLayout>
 </file>
 
@@ -2923,10 +2879,9 @@
           <a:lstStyle/>
           <a:p>
             <a:r>
-              <a:rPr lang="en-US" smtClean="0"/>
+              <a:rPr lang="en-US"/>
               <a:t>Click to edit Master title style</a:t>
             </a:r>
-            <a:endParaRPr lang="en-US"/>
           </a:p>
         </p:txBody>
       </p:sp>
@@ -2955,38 +2910,37 @@
           <a:p>
             <a:pPr lvl="0"/>
             <a:r>
-              <a:rPr lang="en-US" dirty="0" smtClean="0"/>
+              <a:rPr lang="en-US" dirty="0"/>
               <a:t>Click to edit Master text styles</a:t>
             </a:r>
           </a:p>
           <a:p>
             <a:pPr lvl="1"/>
             <a:r>
-              <a:rPr lang="en-US" dirty="0" smtClean="0"/>
+              <a:rPr lang="en-US" dirty="0"/>
               <a:t>Second level</a:t>
             </a:r>
           </a:p>
           <a:p>
             <a:pPr lvl="2"/>
             <a:r>
-              <a:rPr lang="en-US" dirty="0" smtClean="0"/>
+              <a:rPr lang="en-US" dirty="0"/>
               <a:t>Third level</a:t>
             </a:r>
           </a:p>
           <a:p>
             <a:pPr lvl="3"/>
             <a:r>
-              <a:rPr lang="en-US" dirty="0" smtClean="0"/>
+              <a:rPr lang="en-US" dirty="0"/>
               <a:t>Fourth level</a:t>
             </a:r>
           </a:p>
           <a:p>
             <a:pPr lvl="4"/>
             <a:r>
-              <a:rPr lang="en-US" dirty="0" smtClean="0"/>
+              <a:rPr lang="en-US" dirty="0"/>
               <a:t>Fifth level</a:t>
             </a:r>
-            <a:endParaRPr lang="en-US" dirty="0"/>
           </a:p>
         </p:txBody>
       </p:sp>
@@ -3007,7 +2961,7 @@
           <a:p>
             <a:fld id="{FF5D65A6-AB94-4435-B0B7-3743215FA46C}" type="datetime1">
               <a:rPr lang="en-US" smtClean="0"/>
-              <a:t>10/29/2015</a:t>
+              <a:t>10/23/2016</a:t>
             </a:fld>
             <a:endParaRPr lang="en-US"/>
           </a:p>
@@ -3114,13 +3068,6 @@
   <p:clrMapOvr>
     <a:masterClrMapping/>
   </p:clrMapOvr>
-  <p:timing>
-    <p:tnLst>
-      <p:par>
-        <p:cTn id="1" dur="indefinite" restart="never" nodeType="tmRoot"/>
-      </p:par>
-    </p:tnLst>
-  </p:timing>
 </p:sldLayout>
 </file>
 
@@ -3166,10 +3113,9 @@
           </a:lstStyle>
           <a:p>
             <a:r>
-              <a:rPr lang="en-US" smtClean="0"/>
+              <a:rPr lang="en-US"/>
               <a:t>Click to edit Master title style</a:t>
             </a:r>
-            <a:endParaRPr lang="en-US"/>
           </a:p>
         </p:txBody>
       </p:sp>
@@ -3286,7 +3232,7 @@
           <a:p>
             <a:pPr lvl="0"/>
             <a:r>
-              <a:rPr lang="en-US" smtClean="0"/>
+              <a:rPr lang="en-US"/>
               <a:t>Click to edit Master text styles</a:t>
             </a:r>
           </a:p>
@@ -3309,7 +3255,7 @@
           <a:p>
             <a:fld id="{7C193DC4-6EF0-48C9-B29C-616106A645E1}" type="datetime1">
               <a:rPr lang="en-US" smtClean="0"/>
-              <a:t>10/29/2015</a:t>
+              <a:t>10/23/2016</a:t>
             </a:fld>
             <a:endParaRPr lang="en-US"/>
           </a:p>
@@ -3403,10 +3349,9 @@
           <a:lstStyle/>
           <a:p>
             <a:r>
-              <a:rPr lang="en-US" smtClean="0"/>
+              <a:rPr lang="en-US"/>
               <a:t>Click to edit Master title style</a:t>
             </a:r>
-            <a:endParaRPr lang="en-US"/>
           </a:p>
         </p:txBody>
       </p:sp>
@@ -3460,38 +3405,37 @@
           <a:p>
             <a:pPr lvl="0"/>
             <a:r>
-              <a:rPr lang="en-US" smtClean="0"/>
+              <a:rPr lang="en-US"/>
               <a:t>Click to edit Master text styles</a:t>
             </a:r>
           </a:p>
           <a:p>
             <a:pPr lvl="1"/>
             <a:r>
-              <a:rPr lang="en-US" smtClean="0"/>
+              <a:rPr lang="en-US"/>
               <a:t>Second level</a:t>
             </a:r>
           </a:p>
           <a:p>
             <a:pPr lvl="2"/>
             <a:r>
-              <a:rPr lang="en-US" smtClean="0"/>
+              <a:rPr lang="en-US"/>
               <a:t>Third level</a:t>
             </a:r>
           </a:p>
           <a:p>
             <a:pPr lvl="3"/>
             <a:r>
-              <a:rPr lang="en-US" smtClean="0"/>
+              <a:rPr lang="en-US"/>
               <a:t>Fourth level</a:t>
             </a:r>
           </a:p>
           <a:p>
             <a:pPr lvl="4"/>
             <a:r>
-              <a:rPr lang="en-US" smtClean="0"/>
+              <a:rPr lang="en-US"/>
               <a:t>Fifth level</a:t>
             </a:r>
-            <a:endParaRPr lang="en-US"/>
           </a:p>
         </p:txBody>
       </p:sp>
@@ -3545,38 +3489,37 @@
           <a:p>
             <a:pPr lvl="0"/>
             <a:r>
-              <a:rPr lang="en-US" smtClean="0"/>
+              <a:rPr lang="en-US"/>
               <a:t>Click to edit Master text styles</a:t>
             </a:r>
           </a:p>
           <a:p>
             <a:pPr lvl="1"/>
             <a:r>
-              <a:rPr lang="en-US" smtClean="0"/>
+              <a:rPr lang="en-US"/>
               <a:t>Second level</a:t>
             </a:r>
           </a:p>
           <a:p>
             <a:pPr lvl="2"/>
             <a:r>
-              <a:rPr lang="en-US" smtClean="0"/>
+              <a:rPr lang="en-US"/>
               <a:t>Third level</a:t>
             </a:r>
           </a:p>
           <a:p>
             <a:pPr lvl="3"/>
             <a:r>
-              <a:rPr lang="en-US" smtClean="0"/>
+              <a:rPr lang="en-US"/>
               <a:t>Fourth level</a:t>
             </a:r>
           </a:p>
           <a:p>
             <a:pPr lvl="4"/>
             <a:r>
-              <a:rPr lang="en-US" smtClean="0"/>
+              <a:rPr lang="en-US"/>
               <a:t>Fifth level</a:t>
             </a:r>
-            <a:endParaRPr lang="en-US"/>
           </a:p>
         </p:txBody>
       </p:sp>
@@ -3597,7 +3540,7 @@
           <a:p>
             <a:fld id="{5D1846AD-9252-4647-9435-4C2AC365653A}" type="datetime1">
               <a:rPr lang="en-US" smtClean="0"/>
-              <a:t>10/29/2015</a:t>
+              <a:t>10/23/2016</a:t>
             </a:fld>
             <a:endParaRPr lang="en-US"/>
           </a:p>
@@ -3695,10 +3638,9 @@
           </a:lstStyle>
           <a:p>
             <a:r>
-              <a:rPr lang="en-US" smtClean="0"/>
+              <a:rPr lang="en-US"/>
               <a:t>Click to edit Master title style</a:t>
             </a:r>
-            <a:endParaRPr lang="en-US"/>
           </a:p>
         </p:txBody>
       </p:sp>
@@ -3761,7 +3703,7 @@
           <a:p>
             <a:pPr lvl="0"/>
             <a:r>
-              <a:rPr lang="en-US" smtClean="0"/>
+              <a:rPr lang="en-US"/>
               <a:t>Click to edit Master text styles</a:t>
             </a:r>
           </a:p>
@@ -3817,38 +3759,37 @@
           <a:p>
             <a:pPr lvl="0"/>
             <a:r>
-              <a:rPr lang="en-US" smtClean="0"/>
+              <a:rPr lang="en-US"/>
               <a:t>Click to edit Master text styles</a:t>
             </a:r>
           </a:p>
           <a:p>
             <a:pPr lvl="1"/>
             <a:r>
-              <a:rPr lang="en-US" smtClean="0"/>
+              <a:rPr lang="en-US"/>
               <a:t>Second level</a:t>
             </a:r>
           </a:p>
           <a:p>
             <a:pPr lvl="2"/>
             <a:r>
-              <a:rPr lang="en-US" smtClean="0"/>
+              <a:rPr lang="en-US"/>
               <a:t>Third level</a:t>
             </a:r>
           </a:p>
           <a:p>
             <a:pPr lvl="3"/>
             <a:r>
-              <a:rPr lang="en-US" smtClean="0"/>
+              <a:rPr lang="en-US"/>
               <a:t>Fourth level</a:t>
             </a:r>
           </a:p>
           <a:p>
             <a:pPr lvl="4"/>
             <a:r>
-              <a:rPr lang="en-US" smtClean="0"/>
+              <a:rPr lang="en-US"/>
               <a:t>Fifth level</a:t>
             </a:r>
-            <a:endParaRPr lang="en-US"/>
           </a:p>
         </p:txBody>
       </p:sp>
@@ -3911,7 +3852,7 @@
           <a:p>
             <a:pPr lvl="0"/>
             <a:r>
-              <a:rPr lang="en-US" smtClean="0"/>
+              <a:rPr lang="en-US"/>
               <a:t>Click to edit Master text styles</a:t>
             </a:r>
           </a:p>
@@ -3967,38 +3908,37 @@
           <a:p>
             <a:pPr lvl="0"/>
             <a:r>
-              <a:rPr lang="en-US" smtClean="0"/>
+              <a:rPr lang="en-US"/>
               <a:t>Click to edit Master text styles</a:t>
             </a:r>
           </a:p>
           <a:p>
             <a:pPr lvl="1"/>
             <a:r>
-              <a:rPr lang="en-US" smtClean="0"/>
+              <a:rPr lang="en-US"/>
               <a:t>Second level</a:t>
             </a:r>
           </a:p>
           <a:p>
             <a:pPr lvl="2"/>
             <a:r>
-              <a:rPr lang="en-US" smtClean="0"/>
+              <a:rPr lang="en-US"/>
               <a:t>Third level</a:t>
             </a:r>
           </a:p>
           <a:p>
             <a:pPr lvl="3"/>
             <a:r>
-              <a:rPr lang="en-US" smtClean="0"/>
+              <a:rPr lang="en-US"/>
               <a:t>Fourth level</a:t>
             </a:r>
           </a:p>
           <a:p>
             <a:pPr lvl="4"/>
             <a:r>
-              <a:rPr lang="en-US" smtClean="0"/>
+              <a:rPr lang="en-US"/>
               <a:t>Fifth level</a:t>
             </a:r>
-            <a:endParaRPr lang="en-US"/>
           </a:p>
         </p:txBody>
       </p:sp>
@@ -4019,7 +3959,7 @@
           <a:p>
             <a:fld id="{CE56DC10-3561-4063-A6AF-C1CC7A41040A}" type="datetime1">
               <a:rPr lang="en-US" smtClean="0"/>
-              <a:t>10/29/2015</a:t>
+              <a:t>10/23/2016</a:t>
             </a:fld>
             <a:endParaRPr lang="en-US"/>
           </a:p>
@@ -4113,10 +4053,9 @@
           <a:lstStyle/>
           <a:p>
             <a:r>
-              <a:rPr lang="en-US" smtClean="0"/>
+              <a:rPr lang="en-US"/>
               <a:t>Click to edit Master title style</a:t>
             </a:r>
-            <a:endParaRPr lang="en-US"/>
           </a:p>
         </p:txBody>
       </p:sp>
@@ -4137,7 +4076,7 @@
           <a:p>
             <a:fld id="{2F7B77F5-1464-4F6B-92A8-64FC8A508293}" type="datetime1">
               <a:rPr lang="en-US" smtClean="0"/>
-              <a:t>10/29/2015</a:t>
+              <a:t>10/23/2016</a:t>
             </a:fld>
             <a:endParaRPr lang="en-US"/>
           </a:p>
@@ -4195,13 +4134,6 @@
   <p:clrMapOvr>
     <a:masterClrMapping/>
   </p:clrMapOvr>
-  <p:timing>
-    <p:tnLst>
-      <p:par>
-        <p:cTn id="1" dur="indefinite" restart="never" nodeType="tmRoot"/>
-      </p:par>
-    </p:tnLst>
-  </p:timing>
 </p:sldLayout>
 </file>
 
@@ -4265,10 +4197,9 @@
           <a:lstStyle/>
           <a:p>
             <a:r>
-              <a:rPr lang="en-US" smtClean="0"/>
+              <a:rPr lang="en-US"/>
               <a:t>Click to edit Master title style</a:t>
             </a:r>
-            <a:endParaRPr lang="en-US"/>
           </a:p>
         </p:txBody>
       </p:sp>
@@ -4299,38 +4230,37 @@
           <a:p>
             <a:pPr lvl="0"/>
             <a:r>
-              <a:rPr lang="en-US" smtClean="0"/>
+              <a:rPr lang="en-US"/>
               <a:t>Click to edit Master text styles</a:t>
             </a:r>
           </a:p>
           <a:p>
             <a:pPr lvl="1"/>
             <a:r>
-              <a:rPr lang="en-US" smtClean="0"/>
+              <a:rPr lang="en-US"/>
               <a:t>Second level</a:t>
             </a:r>
           </a:p>
           <a:p>
             <a:pPr lvl="2"/>
             <a:r>
-              <a:rPr lang="en-US" smtClean="0"/>
+              <a:rPr lang="en-US"/>
               <a:t>Third level</a:t>
             </a:r>
           </a:p>
           <a:p>
             <a:pPr lvl="3"/>
             <a:r>
-              <a:rPr lang="en-US" smtClean="0"/>
+              <a:rPr lang="en-US"/>
               <a:t>Fourth level</a:t>
             </a:r>
           </a:p>
           <a:p>
             <a:pPr lvl="4"/>
             <a:r>
-              <a:rPr lang="en-US" smtClean="0"/>
+              <a:rPr lang="en-US"/>
               <a:t>Fifth level</a:t>
             </a:r>
-            <a:endParaRPr lang="en-US"/>
           </a:p>
         </p:txBody>
       </p:sp>
@@ -4369,7 +4299,7 @@
           <a:p>
             <a:fld id="{02B3F677-983B-48DB-ADFD-63FE6CBC7FB2}" type="datetime1">
               <a:rPr lang="en-US" smtClean="0"/>
-              <a:t>10/29/2015</a:t>
+              <a:t>10/23/2016</a:t>
             </a:fld>
             <a:endParaRPr lang="en-US"/>
           </a:p>
@@ -4477,13 +4407,6 @@
     <p:sldLayoutId id="2147483673" r:id="rId13"/>
     <p:sldLayoutId id="2147483674" r:id="rId14"/>
   </p:sldLayoutIdLst>
-  <p:timing>
-    <p:tnLst>
-      <p:par>
-        <p:cTn id="1" dur="indefinite" restart="never" nodeType="tmRoot"/>
-      </p:par>
-    </p:tnLst>
-  </p:timing>
   <p:hf hdr="0" ftr="0" dt="0"/>
   <p:txStyles>
     <p:titleStyle>
@@ -4771,41 +4694,40 @@
           <a:lstStyle/>
           <a:p>
             <a:r>
-              <a:rPr lang="en-US" dirty="0" smtClean="0"/>
-              <a:t>Halting Measures and Termination Arguments</a:t>
-            </a:r>
+              <a:rPr lang="en-US" dirty="0"/>
+              <a:t>Halting Measures and Termination Reasoning</a:t>
+            </a:r>
+          </a:p>
+        </p:txBody>
+      </p:sp>
+      <p:sp>
+        <p:nvSpPr>
+          <p:cNvPr id="3" name="Subtitle 2"/>
+          <p:cNvSpPr>
+            <a:spLocks noGrp="1"/>
+          </p:cNvSpPr>
+          <p:nvPr>
+            <p:ph type="subTitle" idx="1"/>
+          </p:nvPr>
+        </p:nvSpPr>
+        <p:spPr/>
+        <p:txBody>
+          <a:bodyPr/>
+          <a:lstStyle/>
+          <a:p>
+            <a:r>
+              <a:rPr lang="en-US" dirty="0"/>
+              <a:t>CS 5010 Program Design Paradigms “Bootcamp”</a:t>
+            </a:r>
+          </a:p>
+          <a:p>
+            <a:r>
+              <a:rPr lang="en-US" dirty="0"/>
+              <a:t>Lesson 8.2</a:t>
+            </a:r>
+          </a:p>
+          <a:p>
             <a:endParaRPr lang="en-US" dirty="0"/>
-          </a:p>
-        </p:txBody>
-      </p:sp>
-      <p:sp>
-        <p:nvSpPr>
-          <p:cNvPr id="3" name="Subtitle 2"/>
-          <p:cNvSpPr>
-            <a:spLocks noGrp="1"/>
-          </p:cNvSpPr>
-          <p:nvPr>
-            <p:ph type="subTitle" idx="1"/>
-          </p:nvPr>
-        </p:nvSpPr>
-        <p:spPr/>
-        <p:txBody>
-          <a:bodyPr/>
-          <a:lstStyle/>
-          <a:p>
-            <a:r>
-              <a:rPr lang="en-US" dirty="0" smtClean="0"/>
-              <a:t>CS 5010 Program Design Paradigms “Bootcamp”</a:t>
-            </a:r>
-          </a:p>
-          <a:p>
-            <a:r>
-              <a:rPr lang="en-US" dirty="0" smtClean="0"/>
-              <a:t>Lesson 8.2</a:t>
-            </a:r>
-          </a:p>
-          <a:p>
-            <a:endParaRPr lang="en-US" dirty="0" smtClean="0"/>
           </a:p>
           <a:p>
             <a:endParaRPr lang="en-US" dirty="0"/>
@@ -4863,29 +4785,29 @@
           <a:lstStyle/>
           <a:p>
             <a:r>
-              <a:rPr lang="en-US" smtClean="0"/>
+              <a:rPr lang="en-US"/>
               <a:t>TexPoint fonts used in EMF. </a:t>
             </a:r>
           </a:p>
           <a:p>
             <a:r>
-              <a:rPr lang="en-US" smtClean="0"/>
+              <a:rPr lang="en-US"/>
               <a:t>Read the TexPoint manual before you delete this box.: </a:t>
             </a:r>
             <a:r>
-              <a:rPr lang="en-US" smtClean="0">
+              <a:rPr lang="en-US">
                 <a:latin typeface="CMMI10"/>
               </a:rPr>
               <a:t>A</a:t>
             </a:r>
             <a:r>
-              <a:rPr lang="en-US" smtClean="0">
+              <a:rPr lang="en-US">
                 <a:latin typeface="CMR10"/>
               </a:rPr>
               <a:t>A</a:t>
             </a:r>
             <a:r>
-              <a:rPr lang="en-US" smtClean="0">
+              <a:rPr lang="en-US">
                 <a:latin typeface="CMSY10ORIG"/>
               </a:rPr>
               <a:t>A</a:t>
@@ -4962,27 +4884,13 @@
             <a:p>
               <a:r>
                 <a:rPr lang="en-US" sz="1000" dirty="0"/>
-                <a:t>© Mitchell Wand, </a:t>
-              </a:r>
-              <a:r>
-                <a:rPr lang="en-US" sz="1000" dirty="0" smtClean="0"/>
-                <a:t>2012-2015</a:t>
+                <a:t>© Mitchell Wand, 2012-2015</a:t>
               </a:r>
             </a:p>
             <a:p>
               <a:r>
-                <a:rPr lang="en-US" sz="1000" dirty="0" smtClean="0"/>
+                <a:rPr lang="en-US" sz="1000" dirty="0"/>
                 <a:t>This work is licensed under a </a:t>
-              </a:r>
-              <a:r>
-                <a:rPr lang="en-US" altLang="en-US" sz="1000" dirty="0" smtClean="0">
-                  <a:solidFill>
-                    <a:srgbClr val="4374B7"/>
-                  </a:solidFill>
-                  <a:latin typeface="Helvetica Neue"/>
-                  <a:hlinkClick r:id="rId5"/>
-                </a:rPr>
-                <a:t>Creative </a:t>
               </a:r>
               <a:r>
                 <a:rPr lang="en-US" altLang="en-US" sz="1000" dirty="0">
@@ -4992,7 +4900,7 @@
                   <a:latin typeface="Helvetica Neue"/>
                   <a:hlinkClick r:id="rId5"/>
                 </a:rPr>
-                <a:t>Commons Attribution-</a:t>
+                <a:t>Creative Commons Attribution-</a:t>
               </a:r>
               <a:r>
                 <a:rPr lang="en-US" altLang="en-US" sz="1000" dirty="0" err="1">
@@ -5015,10 +4923,9 @@
                 <a:t> 4.0 International License</a:t>
               </a:r>
               <a:r>
-                <a:rPr lang="en-US" sz="1000" dirty="0" smtClean="0"/>
+                <a:rPr lang="en-US" sz="1000" dirty="0"/>
                 <a:t>.</a:t>
               </a:r>
-              <a:endParaRPr lang="en-US" sz="1000" dirty="0"/>
             </a:p>
           </p:txBody>
         </p:sp>
@@ -5033,13 +4940,6 @@
   <p:clrMapOvr>
     <a:masterClrMapping/>
   </p:clrMapOvr>
-  <p:timing>
-    <p:tnLst>
-      <p:par>
-        <p:cTn id="1" dur="indefinite" restart="never" nodeType="tmRoot"/>
-      </p:par>
-    </p:tnLst>
-  </p:timing>
 </p:sld>
 </file>
 
@@ -5078,10 +4978,9 @@
           <a:lstStyle/>
           <a:p>
             <a:r>
-              <a:rPr lang="en-US" dirty="0" smtClean="0"/>
+              <a:rPr lang="en-US" dirty="0"/>
               <a:t>What do I need to deliver?</a:t>
             </a:r>
-            <a:endParaRPr lang="en-US" dirty="0"/>
           </a:p>
         </p:txBody>
       </p:sp>
@@ -5103,27 +5002,27 @@
           <a:lstStyle/>
           <a:p>
             <a:r>
-              <a:rPr lang="en-US" dirty="0" smtClean="0"/>
+              <a:rPr lang="en-US" dirty="0"/>
               <a:t>You must write down a halting measure for each function that uses general recursion.</a:t>
             </a:r>
           </a:p>
           <a:p>
             <a:r>
-              <a:rPr lang="en-US" dirty="0" smtClean="0"/>
-              <a:t>You don't have to write down the termination argument, but you should be prepared to explain it at </a:t>
-            </a:r>
-            <a:r>
-              <a:rPr lang="en-US" dirty="0" err="1" smtClean="0"/>
+              <a:rPr lang="en-US" dirty="0"/>
+              <a:t>You don't have to write down the termination reasoning, but you should be prepared to explain it at </a:t>
+            </a:r>
+            <a:r>
+              <a:rPr lang="en-US" dirty="0" err="1"/>
               <a:t>codewalk</a:t>
             </a:r>
             <a:r>
-              <a:rPr lang="en-US" dirty="0" smtClean="0"/>
+              <a:rPr lang="en-US" dirty="0"/>
               <a:t>.</a:t>
             </a:r>
           </a:p>
           <a:p>
             <a:r>
-              <a:rPr lang="en-US" dirty="0" smtClean="0"/>
+              <a:rPr lang="en-US" dirty="0"/>
               <a:t>If your function does not terminate on some input problems, you should write down a description of the inputs on which your program fails to halt.</a:t>
             </a:r>
             <a:endParaRPr lang="en-US" i="1" dirty="0">
@@ -5168,13 +5067,6 @@
   <p:clrMapOvr>
     <a:masterClrMapping/>
   </p:clrMapOvr>
-  <p:timing>
-    <p:tnLst>
-      <p:par>
-        <p:cTn id="1" dur="indefinite" restart="never" nodeType="tmRoot"/>
-      </p:par>
-    </p:tnLst>
-  </p:timing>
 </p:sld>
 </file>
 
@@ -5211,45 +5103,44 @@
           <a:lstStyle/>
           <a:p>
             <a:r>
-              <a:rPr lang="en-US" dirty="0" smtClean="0"/>
+              <a:rPr lang="en-US" dirty="0"/>
               <a:t>A Numeric Example</a:t>
             </a:r>
+          </a:p>
+        </p:txBody>
+      </p:sp>
+      <p:sp>
+        <p:nvSpPr>
+          <p:cNvPr id="4" name="Content Placeholder 3"/>
+          <p:cNvSpPr>
+            <a:spLocks noGrp="1"/>
+          </p:cNvSpPr>
+          <p:nvPr>
+            <p:ph idx="1"/>
+          </p:nvPr>
+        </p:nvSpPr>
+        <p:spPr/>
+        <p:txBody>
+          <a:bodyPr/>
+          <a:lstStyle/>
+          <a:p>
+            <a:r>
+              <a:rPr lang="en-US" dirty="0"/>
+              <a:t>fib : </a:t>
+            </a:r>
+            <a:r>
+              <a:rPr lang="en-US" dirty="0" err="1"/>
+              <a:t>NonNegInt</a:t>
+            </a:r>
+            <a:r>
+              <a:rPr lang="en-US" dirty="0"/>
+              <a:t> -&gt; </a:t>
+            </a:r>
+            <a:r>
+              <a:rPr lang="en-US" dirty="0" err="1"/>
+              <a:t>NonNegInt</a:t>
+            </a:r>
             <a:endParaRPr lang="en-US" dirty="0"/>
-          </a:p>
-        </p:txBody>
-      </p:sp>
-      <p:sp>
-        <p:nvSpPr>
-          <p:cNvPr id="4" name="Content Placeholder 3"/>
-          <p:cNvSpPr>
-            <a:spLocks noGrp="1"/>
-          </p:cNvSpPr>
-          <p:nvPr>
-            <p:ph idx="1"/>
-          </p:nvPr>
-        </p:nvSpPr>
-        <p:spPr/>
-        <p:txBody>
-          <a:bodyPr/>
-          <a:lstStyle/>
-          <a:p>
-            <a:r>
-              <a:rPr lang="en-US" dirty="0" smtClean="0"/>
-              <a:t>fib : </a:t>
-            </a:r>
-            <a:r>
-              <a:rPr lang="en-US" dirty="0" err="1" smtClean="0"/>
-              <a:t>NonNegInt</a:t>
-            </a:r>
-            <a:r>
-              <a:rPr lang="en-US" dirty="0" smtClean="0"/>
-              <a:t> -&gt; </a:t>
-            </a:r>
-            <a:r>
-              <a:rPr lang="en-US" dirty="0" err="1" smtClean="0"/>
-              <a:t>NonNegInt</a:t>
-            </a:r>
-            <a:endParaRPr lang="en-US" dirty="0" smtClean="0"/>
           </a:p>
           <a:p>
             <a:r>
@@ -5309,12 +5200,14 @@
             <a:avLst/>
           </a:prstGeom>
           <a:solidFill>
-            <a:schemeClr val="accent3">
-              <a:lumMod val="40000"/>
-              <a:lumOff val="60000"/>
+            <a:schemeClr val="accent1">
+              <a:lumMod val="20000"/>
+              <a:lumOff val="80000"/>
             </a:schemeClr>
           </a:solidFill>
-          <a:ln/>
+          <a:ln>
+            <a:noFill/>
+          </a:ln>
         </p:spPr>
         <p:style>
           <a:lnRef idx="2">
@@ -5341,7 +5234,7 @@
           <a:p>
             <a:pPr algn="ctr"/>
             <a:r>
-              <a:rPr lang="en-US" dirty="0" smtClean="0">
+              <a:rPr lang="en-US" dirty="0">
                 <a:solidFill>
                   <a:schemeClr val="tx1"/>
                 </a:solidFill>
@@ -5349,7 +5242,7 @@
               <a:t>Here's the standard recursive definition of the </a:t>
             </a:r>
             <a:r>
-              <a:rPr lang="en-US" dirty="0" err="1" smtClean="0">
+              <a:rPr lang="en-US" dirty="0" err="1">
                 <a:solidFill>
                   <a:schemeClr val="tx1"/>
                 </a:solidFill>
@@ -5357,7 +5250,7 @@
               <a:t>fibonacci</a:t>
             </a:r>
             <a:r>
-              <a:rPr lang="en-US" dirty="0" smtClean="0">
+              <a:rPr lang="en-US" dirty="0">
                 <a:solidFill>
                   <a:schemeClr val="tx1"/>
                 </a:solidFill>
@@ -5377,13 +5270,6 @@
   <p:clrMapOvr>
     <a:masterClrMapping/>
   </p:clrMapOvr>
-  <p:timing>
-    <p:tnLst>
-      <p:par>
-        <p:cTn id="1" dur="indefinite" restart="never" nodeType="tmRoot"/>
-      </p:par>
-    </p:tnLst>
-  </p:timing>
 </p:sld>
 </file>
 
@@ -5420,107 +5306,85 @@
           <a:lstStyle/>
           <a:p>
             <a:r>
-              <a:rPr lang="en-US" dirty="0" smtClean="0"/>
+              <a:rPr lang="en-US" dirty="0"/>
               <a:t>A Numeric Example (2)</a:t>
             </a:r>
+          </a:p>
+        </p:txBody>
+      </p:sp>
+      <p:sp>
+        <p:nvSpPr>
+          <p:cNvPr id="4" name="Content Placeholder 3"/>
+          <p:cNvSpPr>
+            <a:spLocks noGrp="1"/>
+          </p:cNvSpPr>
+          <p:nvPr>
+            <p:ph idx="1"/>
+          </p:nvPr>
+        </p:nvSpPr>
+        <p:spPr/>
+        <p:txBody>
+          <a:bodyPr/>
+          <a:lstStyle/>
+          <a:p>
+            <a:r>
+              <a:rPr lang="en-US" dirty="0"/>
+              <a:t>fib : </a:t>
+            </a:r>
+            <a:r>
+              <a:rPr lang="en-US" dirty="0" err="1"/>
+              <a:t>NonNegInt</a:t>
+            </a:r>
+            <a:r>
+              <a:rPr lang="en-US" dirty="0"/>
+              <a:t> -&gt; </a:t>
+            </a:r>
+            <a:r>
+              <a:rPr lang="en-US" dirty="0" err="1"/>
+              <a:t>NonNegInt</a:t>
+            </a:r>
             <a:endParaRPr lang="en-US" dirty="0"/>
           </a:p>
-        </p:txBody>
-      </p:sp>
-      <p:sp>
-        <p:nvSpPr>
-          <p:cNvPr id="4" name="Content Placeholder 3"/>
-          <p:cNvSpPr>
-            <a:spLocks noGrp="1"/>
-          </p:cNvSpPr>
-          <p:nvPr>
-            <p:ph idx="1"/>
-          </p:nvPr>
-        </p:nvSpPr>
-        <p:spPr/>
-        <p:txBody>
-          <a:bodyPr/>
-          <a:lstStyle/>
-          <a:p>
-            <a:r>
-              <a:rPr lang="en-US" dirty="0" smtClean="0"/>
-              <a:t>fib : </a:t>
-            </a:r>
-            <a:r>
-              <a:rPr lang="en-US" dirty="0" err="1" smtClean="0"/>
-              <a:t>NonNegInt</a:t>
-            </a:r>
-            <a:r>
-              <a:rPr lang="en-US" dirty="0" smtClean="0"/>
-              <a:t> -&gt; </a:t>
-            </a:r>
-            <a:r>
-              <a:rPr lang="en-US" dirty="0" err="1" smtClean="0"/>
-              <a:t>NonNegInt</a:t>
-            </a:r>
-            <a:endParaRPr lang="en-US" dirty="0" smtClean="0"/>
-          </a:p>
-          <a:p>
-            <a:r>
-              <a:rPr lang="en-US" dirty="0" smtClean="0"/>
+          <a:p>
+            <a:r>
+              <a:rPr lang="en-US" dirty="0"/>
               <a:t>(define (fib n)</a:t>
             </a:r>
           </a:p>
           <a:p>
             <a:r>
               <a:rPr lang="en-US" dirty="0"/>
-              <a:t> </a:t>
-            </a:r>
-            <a:r>
-              <a:rPr lang="en-US" dirty="0" smtClean="0"/>
-              <a:t> (</a:t>
-            </a:r>
-            <a:r>
-              <a:rPr lang="en-US" dirty="0" err="1" smtClean="0"/>
+              <a:t>  (</a:t>
+            </a:r>
+            <a:r>
+              <a:rPr lang="en-US" dirty="0" err="1"/>
               <a:t>cond</a:t>
             </a:r>
-            <a:endParaRPr lang="en-US" dirty="0" smtClean="0"/>
-          </a:p>
-          <a:p>
-            <a:r>
-              <a:rPr lang="en-US" dirty="0"/>
-              <a:t> </a:t>
-            </a:r>
-            <a:r>
-              <a:rPr lang="en-US" dirty="0" smtClean="0"/>
-              <a:t>  [(= n 0) 1]</a:t>
-            </a:r>
-          </a:p>
-          <a:p>
-            <a:r>
-              <a:rPr lang="en-US" dirty="0"/>
-              <a:t> </a:t>
-            </a:r>
-            <a:r>
-              <a:rPr lang="en-US" dirty="0" smtClean="0"/>
-              <a:t>  [(= n 1) 1]</a:t>
-            </a:r>
-          </a:p>
-          <a:p>
-            <a:r>
-              <a:rPr lang="en-US" dirty="0"/>
-              <a:t> </a:t>
-            </a:r>
-            <a:r>
-              <a:rPr lang="en-US" dirty="0" smtClean="0"/>
-              <a:t>  [else (+ (fib (- n 1))</a:t>
-            </a:r>
-          </a:p>
-          <a:p>
-            <a:r>
-              <a:rPr lang="en-US" dirty="0"/>
-              <a:t> </a:t>
-            </a:r>
-            <a:r>
-              <a:rPr lang="en-US" dirty="0" smtClean="0"/>
-              <a:t>           (fib (- n 2)))]))</a:t>
-            </a:r>
             <a:endParaRPr lang="en-US" dirty="0"/>
+          </a:p>
+          <a:p>
+            <a:r>
+              <a:rPr lang="en-US" dirty="0"/>
+              <a:t>   [(= n 0) 1]</a:t>
+            </a:r>
+          </a:p>
+          <a:p>
+            <a:r>
+              <a:rPr lang="en-US" dirty="0"/>
+              <a:t>   [(= n 1) 1]</a:t>
+            </a:r>
+          </a:p>
+          <a:p>
+            <a:r>
+              <a:rPr lang="en-US" dirty="0"/>
+              <a:t>   [else (+ (fib (- n 1))</a:t>
+            </a:r>
+          </a:p>
+          <a:p>
+            <a:r>
+              <a:rPr lang="en-US" dirty="0"/>
+              <a:t>            (fib (- n 2)))]))</a:t>
+            </a:r>
           </a:p>
         </p:txBody>
       </p:sp>
@@ -5539,12 +5403,14 @@
             <a:avLst/>
           </a:prstGeom>
           <a:solidFill>
-            <a:schemeClr val="accent3">
-              <a:lumMod val="40000"/>
-              <a:lumOff val="60000"/>
+            <a:schemeClr val="accent1">
+              <a:lumMod val="20000"/>
+              <a:lumOff val="80000"/>
             </a:schemeClr>
           </a:solidFill>
-          <a:ln/>
+          <a:ln>
+            <a:noFill/>
+          </a:ln>
         </p:spPr>
         <p:style>
           <a:lnRef idx="2">
@@ -5570,7 +5436,7 @@
           <a:lstStyle/>
           <a:p>
             <a:r>
-              <a:rPr lang="en-US" dirty="0" smtClean="0">
+              <a:rPr lang="en-US" dirty="0">
                 <a:solidFill>
                   <a:schemeClr val="tx1"/>
                 </a:solidFill>
@@ -5579,7 +5445,7 @@
             </a:r>
           </a:p>
           <a:p>
-            <a:endParaRPr lang="en-US" dirty="0" smtClean="0">
+            <a:endParaRPr lang="en-US" dirty="0">
               <a:solidFill>
                 <a:schemeClr val="tx1"/>
               </a:solidFill>
@@ -5587,7 +5453,7 @@
           </a:p>
           <a:p>
             <a:r>
-              <a:rPr lang="en-US" dirty="0" smtClean="0">
+              <a:rPr lang="en-US" dirty="0">
                 <a:solidFill>
                   <a:schemeClr val="tx1"/>
                 </a:solidFill>
@@ -5595,7 +5461,7 @@
               <a:t>When we get to the recursive calls, if </a:t>
             </a:r>
             <a:r>
-              <a:rPr lang="en-US" b="1" dirty="0" smtClean="0">
+              <a:rPr lang="en-US" b="1" dirty="0">
                 <a:solidFill>
                   <a:schemeClr val="tx1"/>
                 </a:solidFill>
@@ -5603,7 +5469,7 @@
               <a:t>n </a:t>
             </a:r>
             <a:r>
-              <a:rPr lang="en-US" dirty="0" smtClean="0">
+              <a:rPr lang="en-US" dirty="0">
                 <a:solidFill>
                   <a:schemeClr val="tx1"/>
                 </a:solidFill>
@@ -5611,7 +5477,7 @@
               <a:t>is a </a:t>
             </a:r>
             <a:r>
-              <a:rPr lang="en-US" dirty="0" err="1" smtClean="0">
+              <a:rPr lang="en-US" dirty="0" err="1">
                 <a:solidFill>
                   <a:schemeClr val="tx1"/>
                 </a:solidFill>
@@ -5619,7 +5485,7 @@
               <a:t>NonNegInt</a:t>
             </a:r>
             <a:r>
-              <a:rPr lang="en-US" dirty="0" smtClean="0">
+              <a:rPr lang="en-US" dirty="0">
                 <a:solidFill>
                   <a:schemeClr val="tx1"/>
                 </a:solidFill>
@@ -5627,7 +5493,7 @@
               <a:t>, and it is not 0 or 1, then it must be greater than or equal to 2, so </a:t>
             </a:r>
             <a:r>
-              <a:rPr lang="en-US" b="1" dirty="0" smtClean="0">
+              <a:rPr lang="en-US" b="1" dirty="0">
                 <a:solidFill>
                   <a:schemeClr val="tx1"/>
                 </a:solidFill>
@@ -5635,7 +5501,7 @@
               <a:t>n-1</a:t>
             </a:r>
             <a:r>
-              <a:rPr lang="en-US" dirty="0" smtClean="0">
+              <a:rPr lang="en-US" dirty="0">
                 <a:solidFill>
                   <a:schemeClr val="tx1"/>
                 </a:solidFill>
@@ -5643,7 +5509,7 @@
               <a:t> and </a:t>
             </a:r>
             <a:r>
-              <a:rPr lang="en-US" b="1" dirty="0" smtClean="0">
+              <a:rPr lang="en-US" b="1" dirty="0">
                 <a:solidFill>
                   <a:schemeClr val="tx1"/>
                 </a:solidFill>
@@ -5651,7 +5517,7 @@
               <a:t>n-2</a:t>
             </a:r>
             <a:r>
-              <a:rPr lang="en-US" dirty="0" smtClean="0">
+              <a:rPr lang="en-US" dirty="0">
                 <a:solidFill>
                   <a:schemeClr val="tx1"/>
                 </a:solidFill>
@@ -5659,7 +5525,7 @@
               <a:t> are both </a:t>
             </a:r>
             <a:r>
-              <a:rPr lang="en-US" dirty="0" err="1" smtClean="0">
+              <a:rPr lang="en-US" dirty="0" err="1">
                 <a:solidFill>
                   <a:schemeClr val="tx1"/>
                 </a:solidFill>
@@ -5667,7 +5533,7 @@
               <a:t>NonNegInt's</a:t>
             </a:r>
             <a:r>
-              <a:rPr lang="en-US" dirty="0" smtClean="0">
+              <a:rPr lang="en-US" dirty="0">
                 <a:solidFill>
                   <a:schemeClr val="tx1"/>
                 </a:solidFill>
@@ -5692,12 +5558,14 @@
             <a:avLst/>
           </a:prstGeom>
           <a:solidFill>
-            <a:schemeClr val="accent3">
-              <a:lumMod val="40000"/>
-              <a:lumOff val="60000"/>
+            <a:schemeClr val="accent1">
+              <a:lumMod val="20000"/>
+              <a:lumOff val="80000"/>
             </a:schemeClr>
           </a:solidFill>
-          <a:ln/>
+          <a:ln>
+            <a:noFill/>
+          </a:ln>
         </p:spPr>
         <p:style>
           <a:lnRef idx="2">
@@ -5723,7 +5591,7 @@
           <a:lstStyle/>
           <a:p>
             <a:r>
-              <a:rPr lang="en-US" dirty="0" smtClean="0">
+              <a:rPr lang="en-US" dirty="0">
                 <a:solidFill>
                   <a:schemeClr val="tx1"/>
                 </a:solidFill>
@@ -5743,13 +5611,6 @@
   <p:clrMapOvr>
     <a:masterClrMapping/>
   </p:clrMapOvr>
-  <p:timing>
-    <p:tnLst>
-      <p:par>
-        <p:cTn id="1" dur="indefinite" restart="never" nodeType="tmRoot"/>
-      </p:par>
-    </p:tnLst>
-  </p:timing>
 </p:sld>
 </file>
 
@@ -5786,14 +5647,13 @@
           <a:lstStyle/>
           <a:p>
             <a:r>
-              <a:rPr lang="en-US" dirty="0" smtClean="0"/>
-              <a:t>Halting measure for </a:t>
-            </a:r>
-            <a:r>
-              <a:rPr lang="en-US" b="1" dirty="0" smtClean="0"/>
+              <a:rPr lang="en-US" dirty="0"/>
+              <a:t>Termination Reasoning for </a:t>
+            </a:r>
+            <a:r>
+              <a:rPr lang="en-US" b="1" dirty="0"/>
               <a:t>fib</a:t>
             </a:r>
-            <a:endParaRPr lang="en-US" b="1" dirty="0"/>
           </a:p>
         </p:txBody>
       </p:sp>
@@ -5813,24 +5673,24 @@
           <a:lstStyle/>
           <a:p>
             <a:r>
-              <a:rPr lang="en-US" dirty="0" smtClean="0"/>
+              <a:rPr lang="en-US" dirty="0"/>
               <a:t>Proposed halting measure: </a:t>
             </a:r>
             <a:r>
-              <a:rPr lang="en-US" b="1" dirty="0" smtClean="0"/>
+              <a:rPr lang="en-US" b="1" dirty="0"/>
               <a:t>n </a:t>
             </a:r>
           </a:p>
           <a:p>
             <a:r>
-              <a:rPr lang="en-US" dirty="0" smtClean="0"/>
+              <a:rPr lang="en-US" dirty="0"/>
               <a:t>Termination argument</a:t>
             </a:r>
           </a:p>
           <a:p>
             <a:pPr lvl="1"/>
             <a:r>
-              <a:rPr lang="en-US" b="1" dirty="0" smtClean="0">
+              <a:rPr lang="en-US" b="1" dirty="0">
                 <a:solidFill>
                   <a:srgbClr val="FF0000"/>
                 </a:solidFill>
@@ -5838,7 +5698,7 @@
               <a:t>n </a:t>
             </a:r>
             <a:r>
-              <a:rPr lang="en-US" dirty="0" smtClean="0">
+              <a:rPr lang="en-US" dirty="0">
                 <a:solidFill>
                   <a:srgbClr val="FF0000"/>
                 </a:solidFill>
@@ -5849,7 +5709,7 @@
           <a:p>
             <a:pPr lvl="1"/>
             <a:r>
-              <a:rPr lang="en-US" dirty="0" smtClean="0">
+              <a:rPr lang="en-US" dirty="0">
                 <a:solidFill>
                   <a:srgbClr val="FF0000"/>
                 </a:solidFill>
@@ -5857,7 +5717,7 @@
               <a:t>At each recursive  call, </a:t>
             </a:r>
             <a:r>
-              <a:rPr lang="en-US" b="1" dirty="0" smtClean="0">
+              <a:rPr lang="en-US" b="1" dirty="0">
                 <a:solidFill>
                   <a:srgbClr val="FF0000"/>
                 </a:solidFill>
@@ -5865,7 +5725,7 @@
               <a:t>n-1</a:t>
             </a:r>
             <a:r>
-              <a:rPr lang="en-US" dirty="0" smtClean="0">
+              <a:rPr lang="en-US" dirty="0">
                 <a:solidFill>
                   <a:srgbClr val="FF0000"/>
                 </a:solidFill>
@@ -5873,7 +5733,7 @@
               <a:t>  and </a:t>
             </a:r>
             <a:r>
-              <a:rPr lang="en-US" b="1" dirty="0" smtClean="0">
+              <a:rPr lang="en-US" b="1" dirty="0">
                 <a:solidFill>
                   <a:srgbClr val="FF0000"/>
                 </a:solidFill>
@@ -5881,7 +5741,7 @@
               <a:t>n-2 </a:t>
             </a:r>
             <a:r>
-              <a:rPr lang="en-US" dirty="0" smtClean="0">
+              <a:rPr lang="en-US" dirty="0">
                 <a:solidFill>
                   <a:srgbClr val="FF0000"/>
                 </a:solidFill>
@@ -5889,7 +5749,7 @@
               <a:t>are both non-negative  integers,  and each is strictly smaller than </a:t>
             </a:r>
             <a:r>
-              <a:rPr lang="en-US" b="1" dirty="0" smtClean="0">
+              <a:rPr lang="en-US" b="1" dirty="0">
                 <a:solidFill>
                   <a:srgbClr val="FF0000"/>
                 </a:solidFill>
@@ -5897,7 +5757,7 @@
               <a:t>n. </a:t>
             </a:r>
             <a:r>
-              <a:rPr lang="en-US" dirty="0" smtClean="0">
+              <a:rPr lang="en-US" dirty="0">
                 <a:solidFill>
                   <a:srgbClr val="FF0000"/>
                 </a:solidFill>
@@ -5905,7 +5765,7 @@
               <a:t>So</a:t>
             </a:r>
             <a:r>
-              <a:rPr lang="en-US" b="1" dirty="0" smtClean="0">
+              <a:rPr lang="en-US" b="1" dirty="0">
                 <a:solidFill>
                   <a:srgbClr val="FF0000"/>
                 </a:solidFill>
@@ -5913,46 +5773,25 @@
               <a:t> n</a:t>
             </a:r>
             <a:r>
-              <a:rPr lang="en-US" dirty="0" smtClean="0">
+              <a:rPr lang="en-US" dirty="0">
                 <a:solidFill>
                   <a:srgbClr val="FF0000"/>
                 </a:solidFill>
               </a:rPr>
-              <a:t> </a:t>
-            </a:r>
-            <a:r>
-              <a:rPr lang="en-US" dirty="0" smtClean="0">
-                <a:solidFill>
-                  <a:srgbClr val="FF0000"/>
-                </a:solidFill>
-              </a:rPr>
-              <a:t>decreases at each recursive </a:t>
-            </a:r>
-            <a:r>
-              <a:rPr lang="en-US" dirty="0" smtClean="0">
-                <a:solidFill>
-                  <a:srgbClr val="FF0000"/>
-                </a:solidFill>
-              </a:rPr>
-              <a:t>call.</a:t>
-            </a:r>
-            <a:endParaRPr lang="en-US" dirty="0" smtClean="0">
-              <a:solidFill>
-                <a:srgbClr val="FF0000"/>
-              </a:solidFill>
-            </a:endParaRPr>
-          </a:p>
-          <a:p>
-            <a:r>
-              <a:rPr lang="en-US" dirty="0" smtClean="0"/>
+              <a:t> decreases at each recursive call.</a:t>
+            </a:r>
+          </a:p>
+          <a:p>
+            <a:r>
+              <a:rPr lang="en-US" dirty="0"/>
               <a:t>So </a:t>
             </a:r>
             <a:r>
-              <a:rPr lang="en-US" b="1" dirty="0" smtClean="0"/>
+              <a:rPr lang="en-US" b="1" dirty="0"/>
               <a:t>n</a:t>
             </a:r>
             <a:r>
-              <a:rPr lang="en-US" dirty="0" smtClean="0"/>
+              <a:rPr lang="en-US" dirty="0"/>
               <a:t> is a halting measure for fib.</a:t>
             </a:r>
           </a:p>
@@ -5994,13 +5833,6 @@
   <p:clrMapOvr>
     <a:masterClrMapping/>
   </p:clrMapOvr>
-  <p:timing>
-    <p:tnLst>
-      <p:par>
-        <p:cTn id="1" dur="indefinite" restart="never" nodeType="tmRoot"/>
-      </p:par>
-    </p:tnLst>
-  </p:timing>
 </p:sld>
 </file>
 
@@ -6037,10 +5869,9 @@
           <a:lstStyle/>
           <a:p>
             <a:r>
-              <a:rPr lang="en-US" dirty="0" smtClean="0"/>
+              <a:rPr lang="en-US" dirty="0"/>
               <a:t>What about (fib -1)?</a:t>
             </a:r>
-            <a:endParaRPr lang="en-US" dirty="0"/>
           </a:p>
         </p:txBody>
       </p:sp>
@@ -6060,48 +5891,41 @@
           <a:lstStyle/>
           <a:p>
             <a:r>
-              <a:rPr lang="en-US" dirty="0" smtClean="0"/>
+              <a:rPr lang="en-US" dirty="0"/>
               <a:t>(fib -1)</a:t>
             </a:r>
           </a:p>
           <a:p>
             <a:r>
-              <a:rPr lang="en-US" dirty="0" smtClean="0"/>
+              <a:rPr lang="en-US" dirty="0"/>
               <a:t>= (+ (fib -2) (fib -3))</a:t>
             </a:r>
           </a:p>
           <a:p>
             <a:r>
-              <a:rPr lang="en-US" dirty="0" smtClean="0"/>
+              <a:rPr lang="en-US" dirty="0"/>
               <a:t>= (+ (+ (fib -3) (fib -4))</a:t>
             </a:r>
           </a:p>
           <a:p>
             <a:r>
               <a:rPr lang="en-US" dirty="0"/>
-              <a:t> </a:t>
-            </a:r>
-            <a:r>
-              <a:rPr lang="en-US" dirty="0" smtClean="0"/>
-              <a:t>    (+ (fib -4) (fib -5))</a:t>
-            </a:r>
-          </a:p>
-          <a:p>
-            <a:r>
-              <a:rPr lang="en-US" dirty="0" smtClean="0"/>
+              <a:t>     (+ (fib -4) (fib -5))</a:t>
+            </a:r>
+          </a:p>
+          <a:p>
+            <a:r>
+              <a:rPr lang="en-US" dirty="0"/>
               <a:t>= etc.</a:t>
             </a:r>
           </a:p>
           <a:p>
             <a:r>
-              <a:rPr lang="en-US" b="0" dirty="0" smtClean="0">
+              <a:rPr lang="en-US" b="0" dirty="0">
                 <a:latin typeface="+mn-lt"/>
               </a:rPr>
               <a:t>Oops!  This doesn't terminate!</a:t>
             </a:r>
-            <a:endParaRPr lang="en-US" b="0" dirty="0">
-              <a:latin typeface="+mn-lt"/>
-            </a:endParaRPr>
           </a:p>
         </p:txBody>
       </p:sp>
@@ -6115,13 +5939,6 @@
   <p:clrMapOvr>
     <a:masterClrMapping/>
   </p:clrMapOvr>
-  <p:timing>
-    <p:tnLst>
-      <p:par>
-        <p:cTn id="1" dur="indefinite" restart="never" nodeType="tmRoot"/>
-      </p:par>
-    </p:tnLst>
-  </p:timing>
 </p:sld>
 </file>
 
@@ -6158,10 +5975,9 @@
           <a:lstStyle/>
           <a:p>
             <a:r>
-              <a:rPr lang="en-US" dirty="0" smtClean="0"/>
+              <a:rPr lang="en-US" dirty="0"/>
               <a:t>What does this tell us?</a:t>
             </a:r>
-            <a:endParaRPr lang="en-US" dirty="0"/>
           </a:p>
         </p:txBody>
       </p:sp>
@@ -6183,69 +5999,68 @@
           <a:lstStyle/>
           <a:p>
             <a:r>
-              <a:rPr lang="en-US" dirty="0" smtClean="0"/>
+              <a:rPr lang="en-US" dirty="0"/>
               <a:t>First, it tells us that using general recursion we can write functions that may not terminate.</a:t>
             </a:r>
           </a:p>
           <a:p>
             <a:r>
-              <a:rPr lang="en-US" dirty="0" smtClean="0"/>
+              <a:rPr lang="en-US" dirty="0"/>
               <a:t>We couldn't do this using structural decomposition.</a:t>
             </a:r>
           </a:p>
           <a:p>
             <a:r>
-              <a:rPr lang="en-US" dirty="0" smtClean="0"/>
+              <a:rPr lang="en-US" dirty="0"/>
               <a:t>Is there something wrong with our termination argument?</a:t>
             </a:r>
           </a:p>
           <a:p>
             <a:r>
-              <a:rPr lang="en-US" dirty="0" smtClean="0"/>
+              <a:rPr lang="en-US" dirty="0"/>
               <a:t>No, because the termination argument only says what happens when </a:t>
             </a:r>
             <a:r>
-              <a:rPr lang="en-US" b="1" dirty="0" smtClean="0"/>
+              <a:rPr lang="en-US" b="1" dirty="0"/>
               <a:t>n</a:t>
             </a:r>
             <a:r>
-              <a:rPr lang="en-US" dirty="0" smtClean="0"/>
+              <a:rPr lang="en-US" dirty="0"/>
               <a:t> is a </a:t>
             </a:r>
             <a:r>
-              <a:rPr lang="en-US" dirty="0" err="1" smtClean="0"/>
+              <a:rPr lang="en-US" dirty="0" err="1"/>
               <a:t>NonNegInt</a:t>
             </a:r>
-            <a:endParaRPr lang="en-US" dirty="0" smtClean="0"/>
-          </a:p>
-          <a:p>
-            <a:r>
-              <a:rPr lang="en-US" dirty="0" smtClean="0"/>
+            <a:endParaRPr lang="en-US" dirty="0"/>
+          </a:p>
+          <a:p>
+            <a:r>
+              <a:rPr lang="en-US" dirty="0"/>
               <a:t>-1 is a contract violation, so anything could happen.</a:t>
             </a:r>
           </a:p>
           <a:p>
             <a:r>
-              <a:rPr lang="en-US" dirty="0" smtClean="0"/>
+              <a:rPr lang="en-US" dirty="0"/>
               <a:t>If we want to make the contract </a:t>
             </a:r>
             <a:r>
-              <a:rPr lang="en-US" dirty="0" err="1" smtClean="0"/>
+              <a:rPr lang="en-US" dirty="0" err="1"/>
               <a:t>Int</a:t>
             </a:r>
             <a:r>
-              <a:rPr lang="en-US" dirty="0" smtClean="0"/>
+              <a:rPr lang="en-US" dirty="0"/>
               <a:t> -&gt; </a:t>
             </a:r>
             <a:r>
-              <a:rPr lang="en-US" dirty="0" err="1" smtClean="0"/>
+              <a:rPr lang="en-US" dirty="0" err="1"/>
               <a:t>Int</a:t>
             </a:r>
             <a:r>
-              <a:rPr lang="en-US" dirty="0" smtClean="0"/>
+              <a:rPr lang="en-US" dirty="0"/>
               <a:t> , then we need to document the non-termination behavior:</a:t>
             </a:r>
-            <a:endParaRPr lang="en-US" dirty="0"/>
           </a:p>
         </p:txBody>
       </p:sp>
@@ -6283,13 +6098,6 @@
   <p:clrMapOvr>
     <a:masterClrMapping/>
   </p:clrMapOvr>
-  <p:timing>
-    <p:tnLst>
-      <p:par>
-        <p:cTn id="1" dur="indefinite" restart="never" nodeType="tmRoot"/>
-      </p:par>
-    </p:tnLst>
-  </p:timing>
 </p:sld>
 </file>
 
@@ -6326,10 +6134,9 @@
           <a:lstStyle/>
           <a:p>
             <a:r>
-              <a:rPr lang="en-US" dirty="0" smtClean="0"/>
+              <a:rPr lang="en-US" dirty="0"/>
               <a:t>Documenting non-termination</a:t>
             </a:r>
-            <a:endParaRPr lang="en-US" dirty="0"/>
           </a:p>
         </p:txBody>
       </p:sp>
@@ -6355,21 +6162,8 @@
             </a:pPr>
             <a:r>
               <a:rPr lang="en-US" dirty="0"/>
-              <a:t>fib : </a:t>
-            </a:r>
-            <a:r>
-              <a:rPr lang="en-US" dirty="0" smtClean="0"/>
-              <a:t>Integer </a:t>
-            </a:r>
-            <a:r>
-              <a:rPr lang="en-US" dirty="0"/>
-              <a:t>-&gt; </a:t>
-            </a:r>
-            <a:r>
-              <a:rPr lang="en-US" dirty="0" smtClean="0"/>
-              <a:t>Integer</a:t>
-            </a:r>
-            <a:endParaRPr lang="en-US" dirty="0"/>
+              <a:t>fib : Integer -&gt; Integer</a:t>
+            </a:r>
           </a:p>
           <a:p>
             <a:pPr>
@@ -6378,7 +6172,7 @@
               </a:spcBef>
             </a:pPr>
             <a:r>
-              <a:rPr lang="en-US" dirty="0" smtClean="0"/>
+              <a:rPr lang="en-US" dirty="0"/>
               <a:t>Halting Measure: </a:t>
             </a:r>
           </a:p>
@@ -6390,11 +6184,7 @@
             </a:pPr>
             <a:r>
               <a:rPr lang="en-US" dirty="0"/>
-              <a:t> </a:t>
-            </a:r>
-            <a:r>
-              <a:rPr lang="en-US" dirty="0" smtClean="0"/>
-              <a:t> If n is non-negative, then n is a halting measure.  </a:t>
+              <a:t>  If n is non-negative, then n is a halting measure.  </a:t>
             </a:r>
           </a:p>
           <a:p>
@@ -6405,13 +6195,8 @@
             </a:pPr>
             <a:r>
               <a:rPr lang="en-US" dirty="0"/>
-              <a:t> </a:t>
-            </a:r>
-            <a:r>
-              <a:rPr lang="en-US" dirty="0" smtClean="0"/>
-              <a:t> If n is negative, the function fails to halt.</a:t>
-            </a:r>
-            <a:endParaRPr lang="en-US" dirty="0"/>
+              <a:t>  If n is negative, the function fails to halt.</a:t>
+            </a:r>
           </a:p>
         </p:txBody>
       </p:sp>
@@ -6448,13 +6233,6 @@
   <p:clrMapOvr>
     <a:masterClrMapping/>
   </p:clrMapOvr>
-  <p:timing>
-    <p:tnLst>
-      <p:par>
-        <p:cTn id="1" dur="indefinite" restart="never" nodeType="tmRoot"/>
-      </p:par>
-    </p:tnLst>
-  </p:timing>
 </p:sld>
 </file>
 
@@ -6493,10 +6271,9 @@
           <a:lstStyle/>
           <a:p>
             <a:r>
-              <a:rPr lang="en-US" dirty="0" smtClean="0"/>
+              <a:rPr lang="en-US" dirty="0"/>
               <a:t>General Recursion vs. Structural Decomposition</a:t>
             </a:r>
-            <a:endParaRPr lang="en-US" dirty="0"/>
           </a:p>
         </p:txBody>
       </p:sp>
@@ -6518,52 +6295,48 @@
           <a:lstStyle/>
           <a:p>
             <a:r>
-              <a:rPr lang="en-US" dirty="0" smtClean="0"/>
+              <a:rPr lang="en-US" dirty="0"/>
               <a:t>Structural decomposition is a special case of General Recursion:  it's a standard recipe for finding </a:t>
             </a:r>
             <a:r>
-              <a:rPr lang="en-US" dirty="0" err="1" smtClean="0"/>
+              <a:rPr lang="en-US" dirty="0" err="1"/>
               <a:t>subproblems</a:t>
             </a:r>
             <a:r>
-              <a:rPr lang="en-US" dirty="0" smtClean="0"/>
+              <a:rPr lang="en-US" dirty="0"/>
               <a:t> that are guaranteed to be easier.</a:t>
             </a:r>
           </a:p>
           <a:p>
             <a:pPr lvl="1"/>
             <a:r>
-              <a:rPr lang="en-US" dirty="0" smtClean="0"/>
+              <a:rPr lang="en-US" dirty="0"/>
               <a:t>A field is always smaller than the structure it’s contained in.</a:t>
             </a:r>
           </a:p>
           <a:p>
             <a:r>
-              <a:rPr lang="en-US" dirty="0" smtClean="0"/>
+              <a:rPr lang="en-US" dirty="0"/>
               <a:t>For general recursion</a:t>
             </a:r>
             <a:r>
-              <a:rPr lang="en-US" smtClean="0"/>
-              <a:t>, </a:t>
-            </a:r>
-            <a:r>
-              <a:rPr lang="en-US" smtClean="0"/>
-              <a:t>you must </a:t>
-            </a:r>
-            <a:r>
-              <a:rPr lang="en-US" dirty="0" smtClean="0"/>
+              <a:rPr lang="en-US"/>
+              <a:t>, you must </a:t>
+            </a:r>
+            <a:r>
+              <a:rPr lang="en-US" dirty="0"/>
               <a:t>always explain in what way the new problems are easier.</a:t>
             </a:r>
           </a:p>
           <a:p>
             <a:r>
-              <a:rPr lang="en-US" dirty="0" smtClean="0"/>
+              <a:rPr lang="en-US" dirty="0"/>
               <a:t>Use structural decomposition when you can, general recursion when you need to.</a:t>
             </a:r>
           </a:p>
           <a:p>
             <a:r>
-              <a:rPr lang="en-US" dirty="0" smtClean="0"/>
+              <a:rPr lang="en-US" dirty="0"/>
               <a:t>Always use the simplest tool that works!</a:t>
             </a:r>
           </a:p>
@@ -6606,13 +6379,6 @@
   <p:clrMapOvr>
     <a:masterClrMapping/>
   </p:clrMapOvr>
-  <p:timing>
-    <p:tnLst>
-      <p:par>
-        <p:cTn id="1" dur="indefinite" restart="never" nodeType="tmRoot"/>
-      </p:par>
-    </p:tnLst>
-  </p:timing>
 </p:sld>
 </file>
 
@@ -6649,21 +6415,20 @@
           <a:lstStyle/>
           <a:p>
             <a:r>
-              <a:rPr lang="en-US" dirty="0" smtClean="0"/>
+              <a:rPr lang="en-US" dirty="0"/>
               <a:t>In the definition of function </a:t>
             </a:r>
             <a:r>
-              <a:rPr lang="en-US" b="1" dirty="0" smtClean="0">
+              <a:rPr lang="en-US" b="1" dirty="0">
                 <a:latin typeface="Consolas" pitchFamily="49" charset="0"/>
                 <a:cs typeface="Consolas" pitchFamily="49" charset="0"/>
               </a:rPr>
               <a:t>f</a:t>
             </a:r>
             <a:r>
-              <a:rPr lang="en-US" dirty="0" smtClean="0"/>
+              <a:rPr lang="en-US" dirty="0"/>
               <a:t> :</a:t>
             </a:r>
-            <a:endParaRPr lang="en-US" dirty="0"/>
           </a:p>
         </p:txBody>
       </p:sp>
@@ -6686,28 +6451,28 @@
               <a:buNone/>
             </a:pPr>
             <a:r>
-              <a:rPr lang="en-US" b="1" dirty="0" smtClean="0">
+              <a:rPr lang="en-US" b="1" dirty="0">
                 <a:latin typeface="Consolas" pitchFamily="49" charset="0"/>
                 <a:cs typeface="Consolas" pitchFamily="49" charset="0"/>
               </a:rPr>
               <a:t>(... (f (rest </a:t>
             </a:r>
             <a:r>
-              <a:rPr lang="en-US" b="1" dirty="0" err="1" smtClean="0">
+              <a:rPr lang="en-US" b="1" dirty="0" err="1">
                 <a:latin typeface="Consolas" pitchFamily="49" charset="0"/>
                 <a:cs typeface="Consolas" pitchFamily="49" charset="0"/>
               </a:rPr>
               <a:t>lst</a:t>
             </a:r>
             <a:r>
-              <a:rPr lang="en-US" b="1" dirty="0" smtClean="0">
+              <a:rPr lang="en-US" b="1" dirty="0">
                 <a:latin typeface="Consolas" pitchFamily="49" charset="0"/>
                 <a:cs typeface="Consolas" pitchFamily="49" charset="0"/>
               </a:rPr>
               <a:t>)))</a:t>
             </a:r>
             <a:r>
-              <a:rPr lang="en-US" dirty="0" smtClean="0"/>
+              <a:rPr lang="en-US" dirty="0"/>
               <a:t> is structural</a:t>
             </a:r>
           </a:p>
@@ -6716,31 +6481,30 @@
               <a:buNone/>
             </a:pPr>
             <a:r>
-              <a:rPr lang="en-US" b="1" dirty="0" smtClean="0">
+              <a:rPr lang="en-US" b="1" dirty="0">
                 <a:latin typeface="Consolas" pitchFamily="49" charset="0"/>
                 <a:cs typeface="Consolas" pitchFamily="49" charset="0"/>
               </a:rPr>
               <a:t>(f (... (rest </a:t>
             </a:r>
             <a:r>
-              <a:rPr lang="en-US" b="1" dirty="0" err="1" smtClean="0">
+              <a:rPr lang="en-US" b="1" dirty="0" err="1">
                 <a:latin typeface="Consolas" pitchFamily="49" charset="0"/>
                 <a:cs typeface="Consolas" pitchFamily="49" charset="0"/>
               </a:rPr>
               <a:t>lst</a:t>
             </a:r>
             <a:r>
-              <a:rPr lang="en-US" b="1" dirty="0" smtClean="0">
+              <a:rPr lang="en-US" b="1" dirty="0">
                 <a:latin typeface="Consolas" pitchFamily="49" charset="0"/>
                 <a:cs typeface="Consolas" pitchFamily="49" charset="0"/>
               </a:rPr>
               <a:t>)))</a:t>
             </a:r>
             <a:r>
-              <a:rPr lang="en-US" dirty="0" smtClean="0"/>
+              <a:rPr lang="en-US" dirty="0"/>
               <a:t> is general</a:t>
             </a:r>
-            <a:endParaRPr lang="en-US" dirty="0"/>
           </a:p>
         </p:txBody>
       </p:sp>
@@ -6783,12 +6547,14 @@
             <a:avLst/>
           </a:prstGeom>
           <a:solidFill>
-            <a:schemeClr val="accent3">
-              <a:lumMod val="40000"/>
-              <a:lumOff val="60000"/>
+            <a:schemeClr val="accent1">
+              <a:lumMod val="20000"/>
+              <a:lumOff val="80000"/>
             </a:schemeClr>
           </a:solidFill>
-          <a:ln/>
+          <a:ln>
+            <a:noFill/>
+          </a:ln>
         </p:spPr>
         <p:style>
           <a:lnRef idx="2">
@@ -6817,7 +6583,6 @@
               <a:rPr lang="en-US" dirty="0"/>
               <a:t>You can usually tell just from the function definition whether it is structural or general recursion. </a:t>
             </a:r>
-            <a:endParaRPr lang="en-US" dirty="0" smtClean="0"/>
           </a:p>
           <a:p>
             <a:endParaRPr lang="en-US" dirty="0"/>
@@ -6849,23 +6614,15 @@
             </a:r>
             <a:r>
               <a:rPr lang="en-US" dirty="0"/>
-              <a:t>, which is a component of the </a:t>
-            </a:r>
-            <a:r>
-              <a:rPr lang="en-US" dirty="0" smtClean="0"/>
-              <a:t>list, and is therefore smaller than </a:t>
-            </a:r>
-            <a:r>
-              <a:rPr lang="en-US" b="1" dirty="0" err="1" smtClean="0"/>
+              <a:t>, which is a component of the list, and is therefore smaller than </a:t>
+            </a:r>
+            <a:r>
+              <a:rPr lang="en-US" b="1" dirty="0" err="1"/>
               <a:t>lst</a:t>
             </a:r>
             <a:r>
-              <a:rPr lang="en-US" dirty="0" smtClean="0"/>
-              <a:t>. </a:t>
-            </a:r>
-            <a:r>
-              <a:rPr lang="en-US" dirty="0"/>
-              <a:t>This is what the list template tells us.</a:t>
+              <a:rPr lang="en-US" dirty="0"/>
+              <a:t>. This is what the list template tells us.</a:t>
             </a:r>
           </a:p>
           <a:p>
@@ -6914,11 +6671,7 @@
             </a:r>
             <a:r>
               <a:rPr lang="en-US" dirty="0"/>
-              <a:t>.  So this example is general recursion</a:t>
-            </a:r>
-            <a:r>
-              <a:rPr lang="en-US" dirty="0" smtClean="0"/>
-              <a:t>.  There’s no telling how big </a:t>
+              <a:t>.  So this example is general recursion.  There’s no telling how big </a:t>
             </a:r>
             <a:r>
               <a:rPr lang="en-US" b="1" dirty="0">
@@ -6935,14 +6688,14 @@
               <a:t>lst</a:t>
             </a:r>
             <a:r>
-              <a:rPr lang="en-US" b="1" dirty="0" smtClean="0">
+              <a:rPr lang="en-US" b="1" dirty="0">
                 <a:latin typeface="Consolas" pitchFamily="49" charset="0"/>
                 <a:cs typeface="Consolas" pitchFamily="49" charset="0"/>
               </a:rPr>
               <a:t>)) </a:t>
             </a:r>
             <a:r>
-              <a:rPr lang="en-US" dirty="0" smtClean="0">
+              <a:rPr lang="en-US" dirty="0">
                 <a:cs typeface="Consolas" pitchFamily="49" charset="0"/>
               </a:rPr>
               <a:t>is. If we call f on it, we’d better have a termination argument to ensure that it has a smaller halting measure.</a:t>
@@ -6961,13 +6714,6 @@
   <p:clrMapOvr>
     <a:masterClrMapping/>
   </p:clrMapOvr>
-  <p:timing>
-    <p:tnLst>
-      <p:par>
-        <p:cTn id="1" dur="indefinite" restart="never" nodeType="tmRoot"/>
-      </p:par>
-    </p:tnLst>
-  </p:timing>
 </p:sld>
 </file>
 
@@ -7004,10 +6750,9 @@
           <a:lstStyle/>
           <a:p>
             <a:r>
-              <a:rPr lang="en-US" dirty="0" smtClean="0"/>
+              <a:rPr lang="en-US" dirty="0"/>
               <a:t>Summary (1)</a:t>
             </a:r>
-            <a:endParaRPr lang="en-US" dirty="0"/>
           </a:p>
         </p:txBody>
       </p:sp>
@@ -7029,11 +6774,11 @@
           <a:lstStyle/>
           <a:p>
             <a:r>
-              <a:rPr lang="en-US" dirty="0" smtClean="0"/>
+              <a:rPr lang="en-US" dirty="0"/>
               <a:t>We've introduced </a:t>
             </a:r>
             <a:r>
-              <a:rPr lang="en-US" i="1" dirty="0" smtClean="0">
+              <a:rPr lang="en-US" i="1" dirty="0">
                 <a:solidFill>
                   <a:srgbClr val="FF0000"/>
                 </a:solidFill>
@@ -7041,31 +6786,31 @@
               <a:t>general recursion</a:t>
             </a:r>
             <a:r>
-              <a:rPr lang="en-US" dirty="0" smtClean="0"/>
+              <a:rPr lang="en-US" dirty="0"/>
               <a:t>.</a:t>
             </a:r>
           </a:p>
           <a:p>
             <a:r>
-              <a:rPr lang="en-US" dirty="0" smtClean="0"/>
+              <a:rPr lang="en-US" dirty="0"/>
               <a:t>Solve the problem by combining solutions to easier </a:t>
             </a:r>
             <a:r>
-              <a:rPr lang="en-US" dirty="0" err="1" smtClean="0"/>
+              <a:rPr lang="en-US" dirty="0" err="1"/>
               <a:t>subproblems</a:t>
             </a:r>
             <a:r>
-              <a:rPr lang="en-US" dirty="0" smtClean="0"/>
+              <a:rPr lang="en-US" dirty="0"/>
               <a:t>.</a:t>
             </a:r>
           </a:p>
           <a:p>
             <a:r>
-              <a:rPr lang="en-US" dirty="0" smtClean="0"/>
+              <a:rPr lang="en-US" dirty="0"/>
               <a:t>Must propose a </a:t>
             </a:r>
             <a:r>
-              <a:rPr lang="en-US" i="1" dirty="0" smtClean="0">
+              <a:rPr lang="en-US" i="1" dirty="0">
                 <a:solidFill>
                   <a:srgbClr val="FF0000"/>
                 </a:solidFill>
@@ -7073,48 +6818,47 @@
               <a:t>halting measure </a:t>
             </a:r>
             <a:r>
-              <a:rPr lang="en-US" dirty="0" smtClean="0"/>
+              <a:rPr lang="en-US" dirty="0"/>
               <a:t>that documents the "difficulty" of each instance of the problem.</a:t>
             </a:r>
           </a:p>
           <a:p>
             <a:r>
-              <a:rPr lang="en-US" dirty="0" smtClean="0"/>
-              <a:t>Must give a </a:t>
-            </a:r>
-            <a:r>
-              <a:rPr lang="en-US" i="1" dirty="0" smtClean="0">
+              <a:rPr lang="en-US" dirty="0"/>
+              <a:t>Must give </a:t>
+            </a:r>
+            <a:r>
+              <a:rPr lang="en-US" i="1" dirty="0">
                 <a:solidFill>
                   <a:srgbClr val="FF0000"/>
                 </a:solidFill>
               </a:rPr>
-              <a:t>termination argument </a:t>
-            </a:r>
-            <a:r>
-              <a:rPr lang="en-US" dirty="0" smtClean="0"/>
+              <a:t>termination reasoning </a:t>
+            </a:r>
+            <a:r>
+              <a:rPr lang="en-US" dirty="0"/>
               <a:t>that explains why the proposed halting measure really is a halting measure for this function.</a:t>
             </a:r>
           </a:p>
           <a:p>
             <a:r>
-              <a:rPr lang="en-US" dirty="0" smtClean="0"/>
+              <a:rPr lang="en-US" dirty="0"/>
               <a:t>Structural decomposition is a special case where the data definition guarantees the </a:t>
             </a:r>
             <a:r>
-              <a:rPr lang="en-US" dirty="0" err="1" smtClean="0"/>
+              <a:rPr lang="en-US" dirty="0" err="1"/>
               <a:t>subproblem</a:t>
             </a:r>
             <a:r>
-              <a:rPr lang="en-US" dirty="0" smtClean="0"/>
+              <a:rPr lang="en-US" dirty="0"/>
               <a:t> is easier.</a:t>
             </a:r>
           </a:p>
           <a:p>
             <a:r>
-              <a:rPr lang="en-US" dirty="0" smtClean="0"/>
+              <a:rPr lang="en-US" dirty="0"/>
               <a:t>Always use the simplest tool that works!</a:t>
             </a:r>
-            <a:endParaRPr lang="en-US" dirty="0"/>
           </a:p>
         </p:txBody>
       </p:sp>
@@ -7152,13 +6896,6 @@
   <p:clrMapOvr>
     <a:masterClrMapping/>
   </p:clrMapOvr>
-  <p:timing>
-    <p:tnLst>
-      <p:par>
-        <p:cTn id="1" dur="indefinite" restart="never" nodeType="tmRoot"/>
-      </p:par>
-    </p:tnLst>
-  </p:timing>
 </p:sld>
 </file>
 
@@ -7197,10 +6934,9 @@
           <a:lstStyle/>
           <a:p>
             <a:r>
-              <a:rPr lang="en-US" dirty="0" smtClean="0"/>
+              <a:rPr lang="en-US" dirty="0"/>
               <a:t>General Recursion is more powerful than structural decomposition</a:t>
             </a:r>
-            <a:endParaRPr lang="en-US" dirty="0"/>
           </a:p>
         </p:txBody>
       </p:sp>
@@ -7223,57 +6959,52 @@
           <a:p>
             <a:r>
               <a:rPr lang="en-US" dirty="0"/>
-              <a:t>Functions written using structural decomposition are guaranteed to halt with an answer, but general recursion allows you to write functions that don't always halt</a:t>
-            </a:r>
-            <a:r>
-              <a:rPr lang="en-US" dirty="0" smtClean="0"/>
+              <a:t>Functions written using structural decomposition are guaranteed to halt with an answer, but general recursion allows you to write functions that don't always halt.</a:t>
+            </a:r>
+          </a:p>
+          <a:p>
+            <a:r>
+              <a:rPr lang="en-US" dirty="0"/>
+              <a:t>So every time we write a function using general recursion, we need to provide some </a:t>
+            </a:r>
+            <a:r>
+              <a:rPr lang="en-US" i="1" dirty="0">
+                <a:solidFill>
+                  <a:srgbClr val="FF0000"/>
+                </a:solidFill>
+              </a:rPr>
+              <a:t>termination reasoning</a:t>
+            </a:r>
+            <a:r>
+              <a:rPr lang="en-US" dirty="0"/>
+              <a:t> that explains why the function really does halt</a:t>
+            </a:r>
+          </a:p>
+          <a:p>
+            <a:pPr lvl="1"/>
+            <a:r>
+              <a:rPr lang="en-US" dirty="0"/>
+              <a:t>or else warn the user that it may not halt.</a:t>
+            </a:r>
+          </a:p>
+          <a:p>
+            <a:pPr lvl="1"/>
+            <a:r>
+              <a:rPr lang="en-US" dirty="0"/>
+              <a:t>easiest way to make a termination argument is by supplying a </a:t>
+            </a:r>
+            <a:r>
+              <a:rPr lang="en-US" i="1" dirty="0">
+                <a:solidFill>
+                  <a:srgbClr val="FF0000"/>
+                </a:solidFill>
+              </a:rPr>
+              <a:t>halting measure</a:t>
+            </a:r>
+            <a:r>
+              <a:rPr lang="en-US" dirty="0"/>
               <a:t>.</a:t>
             </a:r>
-          </a:p>
-          <a:p>
-            <a:r>
-              <a:rPr lang="en-US" dirty="0" smtClean="0"/>
-              <a:t>So every time we write a function using general recursion, we need to provide a </a:t>
-            </a:r>
-            <a:r>
-              <a:rPr lang="en-US" i="1" dirty="0" smtClean="0">
-                <a:solidFill>
-                  <a:srgbClr val="FF0000"/>
-                </a:solidFill>
-              </a:rPr>
-              <a:t>termination argument</a:t>
-            </a:r>
-            <a:r>
-              <a:rPr lang="en-US" dirty="0" smtClean="0"/>
-              <a:t> that explains why the function really does halt</a:t>
-            </a:r>
-          </a:p>
-          <a:p>
-            <a:pPr lvl="1"/>
-            <a:r>
-              <a:rPr lang="en-US" dirty="0" smtClean="0"/>
-              <a:t>or else warn the user that it may not halt.</a:t>
-            </a:r>
-          </a:p>
-          <a:p>
-            <a:pPr lvl="1"/>
-            <a:r>
-              <a:rPr lang="en-US" dirty="0" smtClean="0"/>
-              <a:t>easiest way to make a termination argument is by supplying a </a:t>
-            </a:r>
-            <a:r>
-              <a:rPr lang="en-US" i="1" dirty="0" smtClean="0">
-                <a:solidFill>
-                  <a:srgbClr val="FF0000"/>
-                </a:solidFill>
-              </a:rPr>
-              <a:t>halting measure</a:t>
-            </a:r>
-            <a:r>
-              <a:rPr lang="en-US" dirty="0" smtClean="0"/>
-              <a:t>.</a:t>
-            </a:r>
-            <a:endParaRPr lang="en-US" dirty="0"/>
           </a:p>
           <a:p>
             <a:endParaRPr lang="en-US" dirty="0"/>
@@ -7314,13 +7045,6 @@
   <p:clrMapOvr>
     <a:masterClrMapping/>
   </p:clrMapOvr>
-  <p:timing>
-    <p:tnLst>
-      <p:par>
-        <p:cTn id="1" dur="indefinite" restart="never" nodeType="tmRoot"/>
-      </p:par>
-    </p:tnLst>
-  </p:timing>
 </p:sld>
 </file>
 
@@ -7357,10 +7081,9 @@
           <a:lstStyle/>
           <a:p>
             <a:r>
-              <a:rPr lang="en-US" dirty="0" smtClean="0"/>
+              <a:rPr lang="en-US" dirty="0"/>
               <a:t>Summary (2)</a:t>
             </a:r>
-            <a:endParaRPr lang="en-US" dirty="0"/>
           </a:p>
         </p:txBody>
       </p:sp>
@@ -7383,7 +7106,7 @@
               <a:buNone/>
             </a:pPr>
             <a:r>
-              <a:rPr lang="en-US" dirty="0" smtClean="0"/>
+              <a:rPr lang="en-US" dirty="0"/>
               <a:t>You should now be able to</a:t>
             </a:r>
           </a:p>
@@ -7391,19 +7114,14 @@
             <a:pPr lvl="0"/>
             <a:r>
               <a:rPr lang="en-US" dirty="0"/>
-              <a:t>Identify general recursion and </a:t>
-            </a:r>
-            <a:r>
-              <a:rPr lang="en-US" dirty="0" smtClean="0"/>
-              <a:t>distinguish it from structural decomposition.</a:t>
-            </a:r>
-          </a:p>
-          <a:p>
-            <a:r>
-              <a:rPr lang="en-US" dirty="0" smtClean="0"/>
-              <a:t>Explain the difference between a halting measure and a termination argument.</a:t>
-            </a:r>
-            <a:endParaRPr lang="en-US" dirty="0"/>
+              <a:t>Identify general recursion and distinguish it from structural decomposition.</a:t>
+            </a:r>
+          </a:p>
+          <a:p>
+            <a:r>
+              <a:rPr lang="en-US" dirty="0"/>
+              <a:t>Explain the usual structure of a termination reasoning.</a:t>
+            </a:r>
           </a:p>
         </p:txBody>
       </p:sp>
@@ -7441,13 +7159,6 @@
   <p:clrMapOvr>
     <a:masterClrMapping/>
   </p:clrMapOvr>
-  <p:timing>
-    <p:tnLst>
-      <p:par>
-        <p:cTn id="1" dur="indefinite" restart="never" nodeType="tmRoot"/>
-      </p:par>
-    </p:tnLst>
-  </p:timing>
 </p:sld>
 </file>
 
@@ -7484,10 +7195,9 @@
           <a:lstStyle/>
           <a:p>
             <a:r>
-              <a:rPr lang="en-US" dirty="0" smtClean="0"/>
+              <a:rPr lang="en-US" dirty="0"/>
               <a:t>Next Steps</a:t>
             </a:r>
-            <a:endParaRPr lang="en-US" dirty="0"/>
           </a:p>
         </p:txBody>
       </p:sp>
@@ -7508,47 +7218,34 @@
           <a:p>
             <a:r>
               <a:rPr lang="en-US" dirty="0"/>
-              <a:t>Study the </a:t>
-            </a:r>
-            <a:r>
-              <a:rPr lang="en-US" dirty="0" smtClean="0"/>
-              <a:t>examples </a:t>
-            </a:r>
-            <a:r>
-              <a:rPr lang="en-US" dirty="0"/>
-              <a:t>of general recursion in </a:t>
-            </a:r>
-            <a:r>
-              <a:rPr lang="en-US" dirty="0" smtClean="0"/>
-              <a:t>08-1-decode.rkt, 08-2-merge-sort.rkt</a:t>
-            </a:r>
-            <a:r>
-              <a:rPr lang="en-US" smtClean="0"/>
+              <a:t>Study the examples of general recursion in 08-1-decode.rkt, 08-2-merge-sort.rkt</a:t>
+            </a:r>
+            <a:r>
+              <a:rPr lang="en-US"/>
               <a:t>, and  08-3-fib.rkt in </a:t>
             </a:r>
             <a:r>
-              <a:rPr lang="en-US" dirty="0" smtClean="0"/>
+              <a:rPr lang="en-US" dirty="0"/>
               <a:t>the Examples folder.</a:t>
             </a:r>
           </a:p>
           <a:p>
             <a:r>
-              <a:rPr lang="en-US" dirty="0" smtClean="0"/>
+              <a:rPr lang="en-US" dirty="0"/>
               <a:t>If you have questions about this lesson, ask them on the Discussion Board</a:t>
             </a:r>
           </a:p>
           <a:p>
             <a:r>
-              <a:rPr lang="en-US" dirty="0" smtClean="0"/>
+              <a:rPr lang="en-US" dirty="0"/>
               <a:t>Do Guided Practice 8.2.</a:t>
             </a:r>
           </a:p>
           <a:p>
             <a:r>
-              <a:rPr lang="en-US" dirty="0" smtClean="0"/>
+              <a:rPr lang="en-US" dirty="0"/>
               <a:t>Go on to the next lesson</a:t>
             </a:r>
-            <a:endParaRPr lang="en-US" dirty="0"/>
           </a:p>
         </p:txBody>
       </p:sp>
@@ -7586,13 +7283,6 @@
   <p:clrMapOvr>
     <a:masterClrMapping/>
   </p:clrMapOvr>
-  <p:timing>
-    <p:tnLst>
-      <p:par>
-        <p:cTn id="1" dur="indefinite" restart="never" nodeType="tmRoot"/>
-      </p:par>
-    </p:tnLst>
-  </p:timing>
 </p:sld>
 </file>
 
@@ -7629,10 +7319,9 @@
           <a:lstStyle/>
           <a:p>
             <a:r>
-              <a:rPr lang="en-US" dirty="0" smtClean="0"/>
+              <a:rPr lang="en-US" dirty="0"/>
               <a:t>Halting Measure (1)</a:t>
             </a:r>
-            <a:endParaRPr lang="en-US" dirty="0"/>
           </a:p>
         </p:txBody>
       </p:sp>
@@ -7654,21 +7343,21 @@
           <a:lstStyle/>
           <a:p>
             <a:r>
-              <a:rPr lang="en-US" dirty="0" smtClean="0"/>
+              <a:rPr lang="en-US" dirty="0"/>
               <a:t>New required piece of the function header.</a:t>
             </a:r>
           </a:p>
           <a:p>
             <a:r>
-              <a:rPr lang="en-US" dirty="0" smtClean="0"/>
+              <a:rPr lang="en-US" dirty="0"/>
               <a:t>The halting measure is a way of explaining how each of the </a:t>
             </a:r>
             <a:r>
-              <a:rPr lang="en-US" dirty="0" err="1" smtClean="0"/>
+              <a:rPr lang="en-US" dirty="0" err="1"/>
               <a:t>subproblems</a:t>
             </a:r>
             <a:r>
-              <a:rPr lang="en-US" dirty="0" smtClean="0"/>
+              <a:rPr lang="en-US" dirty="0"/>
               <a:t> are easier than the original</a:t>
             </a:r>
           </a:p>
@@ -7691,7 +7380,7 @@
             </a:r>
           </a:p>
           <a:p>
-            <a:endParaRPr lang="en-US" dirty="0" smtClean="0">
+            <a:endParaRPr lang="en-US" dirty="0">
               <a:solidFill>
                 <a:srgbClr val="FF0000"/>
               </a:solidFill>
@@ -7733,13 +7422,6 @@
   <p:clrMapOvr>
     <a:masterClrMapping/>
   </p:clrMapOvr>
-  <p:timing>
-    <p:tnLst>
-      <p:par>
-        <p:cTn id="1" dur="indefinite" restart="never" nodeType="tmRoot"/>
-      </p:par>
-    </p:tnLst>
-  </p:timing>
 </p:sld>
 </file>
 
@@ -7776,10 +7458,9 @@
           <a:lstStyle/>
           <a:p>
             <a:r>
-              <a:rPr lang="en-US" dirty="0" smtClean="0"/>
+              <a:rPr lang="en-US" dirty="0"/>
               <a:t>Halting Measure (2)</a:t>
             </a:r>
-            <a:endParaRPr lang="en-US" dirty="0"/>
           </a:p>
         </p:txBody>
       </p:sp>
@@ -7801,13 +7482,13 @@
           <a:lstStyle/>
           <a:p>
             <a:r>
-              <a:rPr lang="en-US" dirty="0" smtClean="0"/>
+              <a:rPr lang="en-US" dirty="0"/>
               <a:t>Since the measure is integer-valued, and it decreases at every recursive call, your function can't make more recursive calls than what the halting measure says.</a:t>
             </a:r>
           </a:p>
           <a:p>
             <a:r>
-              <a:rPr lang="en-US" dirty="0" smtClean="0"/>
+              <a:rPr lang="en-US" dirty="0"/>
               <a:t>In particular, it must halt!</a:t>
             </a:r>
           </a:p>
@@ -7847,13 +7528,6 @@
   <p:clrMapOvr>
     <a:masterClrMapping/>
   </p:clrMapOvr>
-  <p:timing>
-    <p:tnLst>
-      <p:par>
-        <p:cTn id="1" dur="indefinite" restart="never" nodeType="tmRoot"/>
-      </p:par>
-    </p:tnLst>
-  </p:timing>
 </p:sld>
 </file>
 
@@ -7890,10 +7564,9 @@
           <a:lstStyle/>
           <a:p>
             <a:r>
-              <a:rPr lang="en-US" dirty="0" smtClean="0"/>
+              <a:rPr lang="en-US" dirty="0"/>
               <a:t>Possible halting measures</a:t>
             </a:r>
-            <a:endParaRPr lang="en-US" dirty="0"/>
           </a:p>
         </p:txBody>
       </p:sp>
@@ -7913,12 +7586,8 @@
           <a:lstStyle/>
           <a:p>
             <a:r>
-              <a:rPr lang="en-US" dirty="0" smtClean="0"/>
-              <a:t>the </a:t>
-            </a:r>
-            <a:r>
-              <a:rPr lang="en-US" dirty="0"/>
-              <a:t>value of a </a:t>
+              <a:rPr lang="en-US" dirty="0"/>
+              <a:t>the value of a </a:t>
             </a:r>
             <a:r>
               <a:rPr lang="en-US" dirty="0" err="1"/>
@@ -7949,10 +7618,9 @@
           </a:p>
           <a:p>
             <a:r>
-              <a:rPr lang="en-US" dirty="0" smtClean="0"/>
+              <a:rPr lang="en-US" dirty="0"/>
               <a:t>a non-negative integer quantity that depends on one of the quantities above</a:t>
             </a:r>
-            <a:endParaRPr lang="en-US" dirty="0"/>
           </a:p>
         </p:txBody>
       </p:sp>
@@ -8025,10 +7693,9 @@
           <a:lstStyle/>
           <a:p>
             <a:r>
-              <a:rPr lang="en-US" dirty="0" smtClean="0"/>
-              <a:t>Termination Argument</a:t>
-            </a:r>
-            <a:endParaRPr lang="en-US" dirty="0"/>
+              <a:rPr lang="en-US" dirty="0"/>
+              <a:t>Termination Reasoning</a:t>
+            </a:r>
           </a:p>
         </p:txBody>
       </p:sp>
@@ -8048,32 +7715,23 @@
           <a:lstStyle/>
           <a:p>
             <a:r>
-              <a:rPr lang="en-US" dirty="0" smtClean="0"/>
-              <a:t>For each function that uses general </a:t>
-            </a:r>
-            <a:r>
-              <a:rPr lang="en-US" dirty="0" smtClean="0"/>
-              <a:t>recursion you </a:t>
-            </a:r>
-            <a:r>
-              <a:rPr lang="en-US" dirty="0" smtClean="0"/>
-              <a:t>need to give</a:t>
+              <a:rPr lang="en-US" dirty="0"/>
+              <a:t>For each function that uses general recursion you need to give</a:t>
             </a:r>
           </a:p>
           <a:p>
             <a:pPr lvl="1"/>
             <a:r>
-              <a:rPr lang="en-US" dirty="0" smtClean="0"/>
+              <a:rPr lang="en-US" dirty="0"/>
               <a:t>your proposed halting measure</a:t>
             </a:r>
           </a:p>
           <a:p>
             <a:pPr lvl="1"/>
             <a:r>
-              <a:rPr lang="en-US" dirty="0" smtClean="0"/>
-              <a:t>an argument that your proposed halting measure really is a halting measure for your function. </a:t>
-            </a:r>
-            <a:endParaRPr lang="en-US" dirty="0"/>
+              <a:rPr lang="en-US" dirty="0"/>
+              <a:t>some reasoning to show that your proposed halting measure really is a halting measure for your function. </a:t>
+            </a:r>
           </a:p>
         </p:txBody>
       </p:sp>
@@ -8146,20 +7804,16 @@
           <a:lstStyle/>
           <a:p>
             <a:r>
-              <a:rPr lang="en-US" dirty="0" smtClean="0"/>
+              <a:rPr lang="en-US" dirty="0"/>
               <a:t>Halting Measure for </a:t>
             </a:r>
             <a:r>
-              <a:rPr lang="en-US" b="1" dirty="0" smtClean="0">
+              <a:rPr lang="en-US" b="1" dirty="0">
                 <a:latin typeface="Consolas" pitchFamily="49" charset="0"/>
                 <a:cs typeface="Consolas" pitchFamily="49" charset="0"/>
               </a:rPr>
               <a:t>decode</a:t>
             </a:r>
-            <a:endParaRPr lang="en-US" b="1" dirty="0">
-              <a:latin typeface="Consolas" pitchFamily="49" charset="0"/>
-              <a:cs typeface="Consolas" pitchFamily="49" charset="0"/>
-            </a:endParaRPr>
           </a:p>
         </p:txBody>
       </p:sp>
@@ -8181,43 +7835,43 @@
           <a:lstStyle/>
           <a:p>
             <a:r>
-              <a:rPr lang="en-US" dirty="0" smtClean="0"/>
+              <a:rPr lang="en-US" dirty="0"/>
               <a:t>Proposed halting measure: the size of </a:t>
             </a:r>
             <a:r>
-              <a:rPr lang="en-US" b="1" dirty="0" err="1" smtClean="0"/>
+              <a:rPr lang="en-US" b="1" dirty="0" err="1"/>
               <a:t>sexp</a:t>
             </a:r>
             <a:r>
-              <a:rPr lang="en-US" dirty="0" smtClean="0"/>
+              <a:rPr lang="en-US" dirty="0"/>
               <a:t>.</a:t>
             </a:r>
           </a:p>
           <a:p>
             <a:r>
-              <a:rPr lang="en-US" dirty="0" smtClean="0"/>
+              <a:rPr lang="en-US" dirty="0"/>
               <a:t>Termination argument:</a:t>
             </a:r>
           </a:p>
           <a:p>
             <a:pPr lvl="1"/>
             <a:r>
-              <a:rPr lang="en-US" dirty="0" smtClean="0"/>
+              <a:rPr lang="en-US" dirty="0"/>
               <a:t>the size of an </a:t>
             </a:r>
             <a:r>
-              <a:rPr lang="en-US" dirty="0" err="1" smtClean="0"/>
+              <a:rPr lang="en-US" dirty="0" err="1"/>
               <a:t>sexp</a:t>
             </a:r>
             <a:r>
-              <a:rPr lang="en-US" dirty="0" smtClean="0"/>
+              <a:rPr lang="en-US" dirty="0"/>
               <a:t> is always a non-negative integer.</a:t>
             </a:r>
           </a:p>
           <a:p>
             <a:pPr lvl="1"/>
             <a:r>
-              <a:rPr lang="en-US" dirty="0" smtClean="0">
+              <a:rPr lang="en-US" dirty="0">
                 <a:solidFill>
                   <a:srgbClr val="FF0000"/>
                 </a:solidFill>
@@ -8225,7 +7879,7 @@
               <a:t>If </a:t>
             </a:r>
             <a:r>
-              <a:rPr lang="en-US" b="1" dirty="0" err="1" smtClean="0">
+              <a:rPr lang="en-US" b="1" dirty="0" err="1">
                 <a:solidFill>
                   <a:srgbClr val="FF0000"/>
                 </a:solidFill>
@@ -8233,7 +7887,7 @@
               <a:t>sexp</a:t>
             </a:r>
             <a:r>
-              <a:rPr lang="en-US" dirty="0" smtClean="0">
+              <a:rPr lang="en-US" dirty="0">
                 <a:solidFill>
                   <a:srgbClr val="FF0000"/>
                 </a:solidFill>
@@ -8241,7 +7895,7 @@
               <a:t> is not a number, then </a:t>
             </a:r>
             <a:r>
-              <a:rPr lang="en-US" b="1" dirty="0" smtClean="0">
+              <a:rPr lang="en-US" b="1" dirty="0">
                 <a:solidFill>
                   <a:srgbClr val="FF0000"/>
                 </a:solidFill>
@@ -8250,7 +7904,7 @@
               <a:t>(second </a:t>
             </a:r>
             <a:r>
-              <a:rPr lang="en-US" b="1" dirty="0" err="1" smtClean="0">
+              <a:rPr lang="en-US" b="1" dirty="0" err="1">
                 <a:solidFill>
                   <a:srgbClr val="FF0000"/>
                 </a:solidFill>
@@ -8259,7 +7913,7 @@
               <a:t>sexp</a:t>
             </a:r>
             <a:r>
-              <a:rPr lang="en-US" b="1" dirty="0" smtClean="0">
+              <a:rPr lang="en-US" b="1" dirty="0">
                 <a:solidFill>
                   <a:srgbClr val="FF0000"/>
                 </a:solidFill>
@@ -8268,7 +7922,7 @@
               <a:t>) </a:t>
             </a:r>
             <a:r>
-              <a:rPr lang="en-US" dirty="0" smtClean="0">
+              <a:rPr lang="en-US" dirty="0">
                 <a:solidFill>
                   <a:srgbClr val="FF0000"/>
                 </a:solidFill>
@@ -8276,7 +7930,7 @@
               <a:t>and </a:t>
             </a:r>
             <a:r>
-              <a:rPr lang="en-US" b="1" dirty="0" smtClean="0">
+              <a:rPr lang="en-US" b="1" dirty="0">
                 <a:solidFill>
                   <a:srgbClr val="FF0000"/>
                 </a:solidFill>
@@ -8285,7 +7939,7 @@
               <a:t>(third </a:t>
             </a:r>
             <a:r>
-              <a:rPr lang="en-US" b="1" dirty="0" err="1" smtClean="0">
+              <a:rPr lang="en-US" b="1" dirty="0" err="1">
                 <a:solidFill>
                   <a:srgbClr val="FF0000"/>
                 </a:solidFill>
@@ -8294,7 +7948,7 @@
               <a:t>sexp</a:t>
             </a:r>
             <a:r>
-              <a:rPr lang="en-US" b="1" dirty="0" smtClean="0">
+              <a:rPr lang="en-US" b="1" dirty="0">
                 <a:solidFill>
                   <a:srgbClr val="FF0000"/>
                 </a:solidFill>
@@ -8303,7 +7957,7 @@
               <a:t>) </a:t>
             </a:r>
             <a:r>
-              <a:rPr lang="en-US" dirty="0" smtClean="0">
+              <a:rPr lang="en-US" dirty="0">
                 <a:solidFill>
                   <a:srgbClr val="FF0000"/>
                 </a:solidFill>
@@ -8311,7 +7965,7 @@
               <a:t>each have strictly smaller size than </a:t>
             </a:r>
             <a:r>
-              <a:rPr lang="en-US" b="1" dirty="0" err="1" smtClean="0">
+              <a:rPr lang="en-US" b="1" dirty="0" err="1">
                 <a:solidFill>
                   <a:srgbClr val="FF0000"/>
                 </a:solidFill>
@@ -8321,7 +7975,7 @@
               <a:t>sexp</a:t>
             </a:r>
             <a:r>
-              <a:rPr lang="en-US" dirty="0" smtClean="0">
+              <a:rPr lang="en-US" dirty="0">
                 <a:solidFill>
                   <a:srgbClr val="FF0000"/>
                 </a:solidFill>
@@ -8331,43 +7985,43 @@
           </a:p>
           <a:p>
             <a:r>
-              <a:rPr lang="en-US" dirty="0" smtClean="0"/>
+              <a:rPr lang="en-US" dirty="0"/>
               <a:t>So </a:t>
             </a:r>
             <a:r>
-              <a:rPr lang="en-US" b="1" dirty="0" smtClean="0">
+              <a:rPr lang="en-US" b="1" dirty="0">
                 <a:latin typeface="+mj-lt"/>
                 <a:cs typeface="Consolas" pitchFamily="49" charset="0"/>
               </a:rPr>
               <a:t>(size </a:t>
             </a:r>
             <a:r>
-              <a:rPr lang="en-US" b="1" dirty="0" err="1" smtClean="0">
+              <a:rPr lang="en-US" b="1" dirty="0" err="1">
                 <a:latin typeface="+mj-lt"/>
                 <a:cs typeface="Consolas" pitchFamily="49" charset="0"/>
               </a:rPr>
               <a:t>sexp</a:t>
             </a:r>
             <a:r>
-              <a:rPr lang="en-US" b="1" dirty="0" smtClean="0">
+              <a:rPr lang="en-US" b="1" dirty="0">
                 <a:latin typeface="+mj-lt"/>
                 <a:cs typeface="Consolas" pitchFamily="49" charset="0"/>
               </a:rPr>
               <a:t>) </a:t>
             </a:r>
             <a:r>
-              <a:rPr lang="en-US" dirty="0" smtClean="0"/>
+              <a:rPr lang="en-US" dirty="0"/>
               <a:t>is a halting measure for </a:t>
             </a:r>
             <a:r>
-              <a:rPr lang="en-US" b="1" dirty="0" smtClean="0">
+              <a:rPr lang="en-US" b="1" dirty="0">
                 <a:latin typeface="Consolas" pitchFamily="49" charset="0"/>
                 <a:cs typeface="Consolas" pitchFamily="49" charset="0"/>
               </a:rPr>
               <a:t>decode</a:t>
             </a:r>
             <a:r>
-              <a:rPr lang="en-US" dirty="0" smtClean="0"/>
+              <a:rPr lang="en-US" dirty="0"/>
               <a:t>.</a:t>
             </a:r>
           </a:p>
@@ -8405,19 +8059,21 @@
         </p:nvSpPr>
         <p:spPr>
           <a:xfrm>
-            <a:off x="3810000" y="5410200"/>
+            <a:off x="3733800" y="5273675"/>
             <a:ext cx="4495800" cy="1447800"/>
           </a:xfrm>
           <a:prstGeom prst="rect">
             <a:avLst/>
           </a:prstGeom>
           <a:solidFill>
-            <a:schemeClr val="accent3">
-              <a:lumMod val="40000"/>
-              <a:lumOff val="60000"/>
+            <a:schemeClr val="accent1">
+              <a:lumMod val="20000"/>
+              <a:lumOff val="80000"/>
             </a:schemeClr>
           </a:solidFill>
-          <a:ln/>
+          <a:ln>
+            <a:noFill/>
+          </a:ln>
         </p:spPr>
         <p:style>
           <a:lnRef idx="2">
@@ -8443,7 +8099,7 @@
           <a:lstStyle/>
           <a:p>
             <a:r>
-              <a:rPr lang="en-US" dirty="0" smtClean="0">
+              <a:rPr lang="en-US" dirty="0">
                 <a:solidFill>
                   <a:schemeClr val="tx1"/>
                 </a:solidFill>
@@ -8451,7 +8107,7 @@
               <a:t>There are many ways to define the size of an </a:t>
             </a:r>
             <a:r>
-              <a:rPr lang="en-US" dirty="0" err="1" smtClean="0">
+              <a:rPr lang="en-US" dirty="0" err="1">
                 <a:solidFill>
                   <a:schemeClr val="tx1"/>
                 </a:solidFill>
@@ -8459,7 +8115,7 @@
               <a:t>Sexp</a:t>
             </a:r>
             <a:r>
-              <a:rPr lang="en-US" dirty="0" smtClean="0">
+              <a:rPr lang="en-US" dirty="0">
                 <a:solidFill>
                   <a:schemeClr val="tx1"/>
                 </a:solidFill>
@@ -8467,7 +8123,7 @@
               <a:t>.  You could, for example, define it as the  total number of characters needed to print out the </a:t>
             </a:r>
             <a:r>
-              <a:rPr lang="en-US" dirty="0" err="1" smtClean="0">
+              <a:rPr lang="en-US" dirty="0" err="1">
                 <a:solidFill>
                   <a:schemeClr val="tx1"/>
                 </a:solidFill>
@@ -8475,18 +8131,13 @@
               <a:t>sexp</a:t>
             </a:r>
             <a:r>
-              <a:rPr lang="en-US" dirty="0" smtClean="0">
+              <a:rPr lang="en-US" dirty="0">
                 <a:solidFill>
                   <a:schemeClr val="tx1"/>
                 </a:solidFill>
               </a:rPr>
               <a:t>.  Can you write this as a function?</a:t>
             </a:r>
-            <a:endParaRPr lang="en-US" dirty="0">
-              <a:solidFill>
-                <a:schemeClr val="tx1"/>
-              </a:solidFill>
-            </a:endParaRPr>
           </a:p>
         </p:txBody>
       </p:sp>
@@ -8500,13 +8151,6 @@
   <p:clrMapOvr>
     <a:masterClrMapping/>
   </p:clrMapOvr>
-  <p:timing>
-    <p:tnLst>
-      <p:par>
-        <p:cTn id="1" dur="indefinite" restart="never" nodeType="tmRoot"/>
-      </p:par>
-    </p:tnLst>
-  </p:timing>
 </p:sld>
 </file>
 
@@ -8539,440 +8183,410 @@
         </p:nvSpPr>
         <p:spPr/>
         <p:txBody>
-          <a:bodyPr/>
-          <a:lstStyle/>
-          <a:p>
-            <a:r>
-              <a:rPr lang="en-US" dirty="0" smtClean="0"/>
-              <a:t>Halting Measure for </a:t>
-            </a:r>
-            <a:r>
-              <a:rPr lang="en-US" b="1" dirty="0" smtClean="0">
+          <a:bodyPr>
+            <a:normAutofit fontScale="90000"/>
+          </a:bodyPr>
+          <a:lstStyle/>
+          <a:p>
+            <a:r>
+              <a:rPr lang="en-US" dirty="0"/>
+              <a:t>Termination reasoning for </a:t>
+            </a:r>
+            <a:r>
+              <a:rPr lang="en-US" b="1" dirty="0">
                 <a:latin typeface="Consolas" pitchFamily="49" charset="0"/>
                 <a:cs typeface="Consolas" pitchFamily="49" charset="0"/>
               </a:rPr>
               <a:t>merge-sort</a:t>
             </a:r>
-            <a:endParaRPr lang="en-US" b="1" dirty="0">
+          </a:p>
+        </p:txBody>
+      </p:sp>
+      <p:sp>
+        <p:nvSpPr>
+          <p:cNvPr id="3" name="Content Placeholder 2"/>
+          <p:cNvSpPr>
+            <a:spLocks noGrp="1"/>
+          </p:cNvSpPr>
+          <p:nvPr>
+            <p:ph idx="1"/>
+          </p:nvPr>
+        </p:nvSpPr>
+        <p:spPr/>
+        <p:txBody>
+          <a:bodyPr>
+            <a:normAutofit fontScale="77500" lnSpcReduction="20000"/>
+          </a:bodyPr>
+          <a:lstStyle/>
+          <a:p>
+            <a:r>
+              <a:rPr lang="en-US" sz="3300" dirty="0">
+                <a:latin typeface="+mj-lt"/>
+                <a:cs typeface="Consolas" pitchFamily="49" charset="0"/>
+              </a:rPr>
+              <a:t>Proposed halting measure:  </a:t>
+            </a:r>
+            <a:r>
+              <a:rPr lang="en-US" sz="3300" b="1" dirty="0">
+                <a:latin typeface="+mj-lt"/>
+                <a:cs typeface="Consolas" pitchFamily="49" charset="0"/>
+              </a:rPr>
+              <a:t>(length </a:t>
+            </a:r>
+            <a:r>
+              <a:rPr lang="en-US" sz="3300" b="1" dirty="0" err="1">
+                <a:latin typeface="+mj-lt"/>
+                <a:cs typeface="Consolas" pitchFamily="49" charset="0"/>
+              </a:rPr>
+              <a:t>lst</a:t>
+            </a:r>
+            <a:r>
+              <a:rPr lang="en-US" sz="3300" b="1" dirty="0">
+                <a:latin typeface="+mj-lt"/>
+                <a:cs typeface="Consolas" pitchFamily="49" charset="0"/>
+              </a:rPr>
+              <a:t>)</a:t>
+            </a:r>
+          </a:p>
+          <a:p>
+            <a:r>
+              <a:rPr lang="en-US" sz="3300" dirty="0">
+                <a:cs typeface="Consolas" pitchFamily="49" charset="0"/>
+              </a:rPr>
+              <a:t>Termination reasoning:</a:t>
+            </a:r>
+          </a:p>
+          <a:p>
+            <a:pPr lvl="1"/>
+            <a:r>
+              <a:rPr lang="en-US" sz="3300" b="1" dirty="0">
+                <a:latin typeface="Consolas" pitchFamily="49" charset="0"/>
+                <a:cs typeface="Consolas" pitchFamily="49" charset="0"/>
+              </a:rPr>
+              <a:t>(length </a:t>
+            </a:r>
+            <a:r>
+              <a:rPr lang="en-US" sz="3300" b="1" dirty="0" err="1">
+                <a:latin typeface="Consolas" pitchFamily="49" charset="0"/>
+                <a:cs typeface="Consolas" pitchFamily="49" charset="0"/>
+              </a:rPr>
+              <a:t>lst</a:t>
+            </a:r>
+            <a:r>
+              <a:rPr lang="en-US" sz="3300" b="1" dirty="0">
+                <a:latin typeface="Consolas" pitchFamily="49" charset="0"/>
+                <a:cs typeface="Consolas" pitchFamily="49" charset="0"/>
+              </a:rPr>
+              <a:t>) </a:t>
+            </a:r>
+            <a:r>
+              <a:rPr lang="en-US" sz="3300" dirty="0"/>
+              <a:t>is always  a non-negative integer.</a:t>
+            </a:r>
+          </a:p>
+          <a:p>
+            <a:pPr lvl="1"/>
+            <a:r>
+              <a:rPr lang="en-US" sz="3300" dirty="0">
+                <a:solidFill>
+                  <a:srgbClr val="FF0000"/>
+                </a:solidFill>
+              </a:rPr>
+              <a:t>At each recursive call, </a:t>
+            </a:r>
+            <a:r>
+              <a:rPr lang="en-US" sz="3300" b="1" dirty="0">
+                <a:solidFill>
+                  <a:srgbClr val="FF0000"/>
+                </a:solidFill>
+                <a:latin typeface="Consolas" pitchFamily="49" charset="0"/>
+                <a:cs typeface="Consolas" pitchFamily="49" charset="0"/>
+              </a:rPr>
+              <a:t>(length </a:t>
+            </a:r>
+            <a:r>
+              <a:rPr lang="en-US" sz="3300" b="1" dirty="0" err="1">
+                <a:solidFill>
+                  <a:srgbClr val="FF0000"/>
+                </a:solidFill>
+                <a:latin typeface="Consolas" pitchFamily="49" charset="0"/>
+                <a:cs typeface="Consolas" pitchFamily="49" charset="0"/>
+              </a:rPr>
+              <a:t>lst</a:t>
+            </a:r>
+            <a:r>
+              <a:rPr lang="en-US" sz="3300" b="1" dirty="0">
+                <a:solidFill>
+                  <a:srgbClr val="FF0000"/>
+                </a:solidFill>
+                <a:latin typeface="Consolas" pitchFamily="49" charset="0"/>
+                <a:cs typeface="Consolas" pitchFamily="49" charset="0"/>
+              </a:rPr>
+              <a:t>) </a:t>
+            </a:r>
+            <a:r>
+              <a:rPr lang="en-US" sz="3300" dirty="0">
+                <a:solidFill>
+                  <a:srgbClr val="FF0000"/>
+                </a:solidFill>
+              </a:rPr>
+              <a:t>≥ 2</a:t>
+            </a:r>
+          </a:p>
+          <a:p>
+            <a:pPr lvl="1"/>
+            <a:r>
+              <a:rPr lang="en-US" sz="3300" dirty="0">
+                <a:solidFill>
+                  <a:srgbClr val="FF0000"/>
+                </a:solidFill>
+              </a:rPr>
+              <a:t>If </a:t>
+            </a:r>
+            <a:r>
+              <a:rPr lang="en-US" sz="3300" b="1" dirty="0">
+                <a:solidFill>
+                  <a:srgbClr val="FF0000"/>
+                </a:solidFill>
+                <a:latin typeface="Consolas" pitchFamily="49" charset="0"/>
+                <a:cs typeface="Consolas" pitchFamily="49" charset="0"/>
+              </a:rPr>
+              <a:t>(length </a:t>
+            </a:r>
+            <a:r>
+              <a:rPr lang="en-US" sz="3300" b="1" dirty="0" err="1">
+                <a:solidFill>
+                  <a:srgbClr val="FF0000"/>
+                </a:solidFill>
+                <a:latin typeface="Consolas" pitchFamily="49" charset="0"/>
+                <a:cs typeface="Consolas" pitchFamily="49" charset="0"/>
+              </a:rPr>
+              <a:t>lst</a:t>
+            </a:r>
+            <a:r>
+              <a:rPr lang="en-US" sz="3300" b="1" dirty="0">
+                <a:solidFill>
+                  <a:srgbClr val="FF0000"/>
+                </a:solidFill>
+                <a:latin typeface="Consolas" pitchFamily="49" charset="0"/>
+                <a:cs typeface="Consolas" pitchFamily="49" charset="0"/>
+              </a:rPr>
+              <a:t>) </a:t>
+            </a:r>
+            <a:r>
+              <a:rPr lang="en-US" sz="3300" dirty="0">
+                <a:solidFill>
+                  <a:srgbClr val="FF0000"/>
+                </a:solidFill>
+              </a:rPr>
+              <a:t>≥ 2, then </a:t>
+            </a:r>
+          </a:p>
+          <a:p>
+            <a:pPr marL="57150" indent="0">
+              <a:buNone/>
+            </a:pPr>
+            <a:r>
+              <a:rPr lang="en-US" sz="3300" b="1" dirty="0">
+                <a:solidFill>
+                  <a:srgbClr val="FF0000"/>
+                </a:solidFill>
+                <a:latin typeface="Consolas" pitchFamily="49" charset="0"/>
+                <a:cs typeface="Consolas" pitchFamily="49" charset="0"/>
+              </a:rPr>
+              <a:t>  	(length (even-elements </a:t>
+            </a:r>
+            <a:r>
+              <a:rPr lang="en-US" sz="3300" b="1" dirty="0" err="1">
+                <a:solidFill>
+                  <a:srgbClr val="FF0000"/>
+                </a:solidFill>
+                <a:latin typeface="Consolas" pitchFamily="49" charset="0"/>
+                <a:cs typeface="Consolas" pitchFamily="49" charset="0"/>
+              </a:rPr>
+              <a:t>lst</a:t>
+            </a:r>
+            <a:r>
+              <a:rPr lang="en-US" sz="3300" b="1" dirty="0">
+                <a:solidFill>
+                  <a:srgbClr val="FF0000"/>
+                </a:solidFill>
+                <a:latin typeface="Consolas" pitchFamily="49" charset="0"/>
+                <a:cs typeface="Consolas" pitchFamily="49" charset="0"/>
+              </a:rPr>
+              <a:t>))</a:t>
+            </a:r>
+            <a:r>
+              <a:rPr lang="en-US" sz="3300" dirty="0">
+                <a:solidFill>
+                  <a:srgbClr val="FF0000"/>
+                </a:solidFill>
+              </a:rPr>
+              <a:t> and </a:t>
+            </a:r>
+          </a:p>
+          <a:p>
+            <a:pPr marL="57150" indent="0">
+              <a:buNone/>
+            </a:pPr>
+            <a:r>
+              <a:rPr lang="en-US" sz="3300" b="1" dirty="0">
+                <a:solidFill>
+                  <a:srgbClr val="FF0000"/>
+                </a:solidFill>
+                <a:latin typeface="Consolas" pitchFamily="49" charset="0"/>
+                <a:cs typeface="Consolas" pitchFamily="49" charset="0"/>
+              </a:rPr>
+              <a:t> 	 (length (even-elements (rest </a:t>
+            </a:r>
+            <a:r>
+              <a:rPr lang="en-US" sz="3300" b="1" dirty="0" err="1">
+                <a:solidFill>
+                  <a:srgbClr val="FF0000"/>
+                </a:solidFill>
+                <a:latin typeface="Consolas" pitchFamily="49" charset="0"/>
+                <a:cs typeface="Consolas" pitchFamily="49" charset="0"/>
+              </a:rPr>
+              <a:t>lst</a:t>
+            </a:r>
+            <a:r>
+              <a:rPr lang="en-US" sz="3300" b="1" dirty="0">
+                <a:solidFill>
+                  <a:srgbClr val="FF0000"/>
+                </a:solidFill>
+                <a:latin typeface="Consolas" pitchFamily="49" charset="0"/>
+                <a:cs typeface="Consolas" pitchFamily="49" charset="0"/>
+              </a:rPr>
+              <a:t>)))</a:t>
+            </a:r>
+          </a:p>
+          <a:p>
+            <a:pPr marL="57150" indent="0">
+              <a:buNone/>
+            </a:pPr>
+            <a:r>
+              <a:rPr lang="en-US" sz="3300" dirty="0">
+                <a:solidFill>
+                  <a:srgbClr val="FF0000"/>
+                </a:solidFill>
+              </a:rPr>
+              <a:t>   	are both </a:t>
+            </a:r>
+            <a:r>
+              <a:rPr lang="en-US" sz="3300" b="1" i="1" dirty="0">
+                <a:solidFill>
+                  <a:schemeClr val="accent3">
+                    <a:lumMod val="50000"/>
+                  </a:schemeClr>
+                </a:solidFill>
+              </a:rPr>
+              <a:t>strictly less </a:t>
+            </a:r>
+            <a:r>
+              <a:rPr lang="en-US" sz="3300" dirty="0">
+                <a:solidFill>
+                  <a:srgbClr val="FF0000"/>
+                </a:solidFill>
+              </a:rPr>
+              <a:t>than </a:t>
+            </a:r>
+            <a:r>
+              <a:rPr lang="en-US" sz="3300" b="1" dirty="0">
+                <a:solidFill>
+                  <a:srgbClr val="FF0000"/>
+                </a:solidFill>
+                <a:latin typeface="Consolas" pitchFamily="49" charset="0"/>
+                <a:cs typeface="Consolas" pitchFamily="49" charset="0"/>
+              </a:rPr>
+              <a:t>(length </a:t>
+            </a:r>
+            <a:r>
+              <a:rPr lang="en-US" sz="3300" b="1" dirty="0" err="1">
+                <a:solidFill>
+                  <a:srgbClr val="FF0000"/>
+                </a:solidFill>
+                <a:latin typeface="Consolas" pitchFamily="49" charset="0"/>
+                <a:cs typeface="Consolas" pitchFamily="49" charset="0"/>
+              </a:rPr>
+              <a:t>lst</a:t>
+            </a:r>
+            <a:r>
+              <a:rPr lang="en-US" sz="3300" b="1" dirty="0">
+                <a:solidFill>
+                  <a:srgbClr val="FF0000"/>
+                </a:solidFill>
+                <a:latin typeface="Consolas" pitchFamily="49" charset="0"/>
+                <a:cs typeface="Consolas" pitchFamily="49" charset="0"/>
+              </a:rPr>
+              <a:t>).</a:t>
+            </a:r>
+          </a:p>
+          <a:p>
+            <a:pPr marL="57150" indent="0"/>
+            <a:r>
+              <a:rPr lang="en-US" sz="3300" b="1" dirty="0">
+                <a:latin typeface="Consolas" pitchFamily="49" charset="0"/>
+                <a:cs typeface="Consolas" pitchFamily="49" charset="0"/>
+              </a:rPr>
+              <a:t> </a:t>
+            </a:r>
+            <a:r>
+              <a:rPr lang="en-US" sz="3300" dirty="0">
+                <a:cs typeface="Consolas" pitchFamily="49" charset="0"/>
+              </a:rPr>
+              <a:t>So</a:t>
+            </a:r>
+            <a:r>
+              <a:rPr lang="en-US" sz="3300" b="1" dirty="0">
+                <a:latin typeface="Consolas" pitchFamily="49" charset="0"/>
+                <a:cs typeface="Consolas" pitchFamily="49" charset="0"/>
+              </a:rPr>
+              <a:t> (length </a:t>
+            </a:r>
+            <a:r>
+              <a:rPr lang="en-US" sz="3300" b="1" dirty="0" err="1">
+                <a:latin typeface="Consolas" pitchFamily="49" charset="0"/>
+                <a:cs typeface="Consolas" pitchFamily="49" charset="0"/>
+              </a:rPr>
+              <a:t>lst</a:t>
+            </a:r>
+            <a:r>
+              <a:rPr lang="en-US" sz="3300" b="1" dirty="0">
+                <a:latin typeface="Consolas" pitchFamily="49" charset="0"/>
+                <a:cs typeface="Consolas" pitchFamily="49" charset="0"/>
+              </a:rPr>
+              <a:t>) </a:t>
+            </a:r>
+            <a:r>
+              <a:rPr lang="en-US" sz="3300" dirty="0">
+                <a:cs typeface="Consolas" pitchFamily="49" charset="0"/>
+              </a:rPr>
+              <a:t>is a halting measure for </a:t>
+            </a:r>
+            <a:r>
+              <a:rPr lang="en-US" sz="3300" b="1" dirty="0">
+                <a:latin typeface="Consolas" pitchFamily="49" charset="0"/>
+                <a:cs typeface="Consolas" pitchFamily="49" charset="0"/>
+              </a:rPr>
+              <a:t>merge-sort</a:t>
+            </a:r>
+            <a:r>
+              <a:rPr lang="en-US" sz="3300" dirty="0">
+                <a:cs typeface="Consolas" pitchFamily="49" charset="0"/>
+              </a:rPr>
+              <a:t>.</a:t>
+            </a:r>
+            <a:endParaRPr lang="en-US" sz="3300" b="1" dirty="0">
               <a:latin typeface="Consolas" pitchFamily="49" charset="0"/>
               <a:cs typeface="Consolas" pitchFamily="49" charset="0"/>
             </a:endParaRPr>
           </a:p>
-        </p:txBody>
-      </p:sp>
-      <p:sp>
-        <p:nvSpPr>
-          <p:cNvPr id="3" name="Content Placeholder 2"/>
-          <p:cNvSpPr>
-            <a:spLocks noGrp="1"/>
-          </p:cNvSpPr>
-          <p:nvPr>
-            <p:ph idx="1"/>
-          </p:nvPr>
-        </p:nvSpPr>
-        <p:spPr/>
-        <p:txBody>
-          <a:bodyPr>
-            <a:normAutofit fontScale="77500" lnSpcReduction="20000"/>
-          </a:bodyPr>
-          <a:lstStyle/>
-          <a:p>
-            <a:r>
-              <a:rPr lang="en-US" sz="3300" dirty="0" smtClean="0">
-                <a:latin typeface="+mj-lt"/>
-                <a:cs typeface="Consolas" pitchFamily="49" charset="0"/>
-              </a:rPr>
-              <a:t>Proposed halting measure:  </a:t>
-            </a:r>
-            <a:r>
-              <a:rPr lang="en-US" sz="3300" b="1" dirty="0" smtClean="0">
-                <a:latin typeface="+mj-lt"/>
-                <a:cs typeface="Consolas" pitchFamily="49" charset="0"/>
-              </a:rPr>
-              <a:t>(length </a:t>
-            </a:r>
-            <a:r>
-              <a:rPr lang="en-US" sz="3300" b="1" dirty="0" err="1" smtClean="0">
-                <a:latin typeface="+mj-lt"/>
-                <a:cs typeface="Consolas" pitchFamily="49" charset="0"/>
-              </a:rPr>
-              <a:t>lst</a:t>
-            </a:r>
-            <a:r>
-              <a:rPr lang="en-US" sz="3300" b="1" dirty="0" smtClean="0">
-                <a:latin typeface="+mj-lt"/>
-                <a:cs typeface="Consolas" pitchFamily="49" charset="0"/>
-              </a:rPr>
-              <a:t>)</a:t>
-            </a:r>
-          </a:p>
-          <a:p>
-            <a:r>
-              <a:rPr lang="en-US" sz="3300" dirty="0" smtClean="0">
-                <a:cs typeface="Consolas" pitchFamily="49" charset="0"/>
-              </a:rPr>
-              <a:t>Termination argument:</a:t>
-            </a:r>
-          </a:p>
-          <a:p>
-            <a:pPr lvl="1"/>
-            <a:r>
-              <a:rPr lang="en-US" sz="3300" b="1" dirty="0" smtClean="0">
-                <a:latin typeface="Consolas" pitchFamily="49" charset="0"/>
-                <a:cs typeface="Consolas" pitchFamily="49" charset="0"/>
-              </a:rPr>
-              <a:t>(length </a:t>
-            </a:r>
-            <a:r>
-              <a:rPr lang="en-US" sz="3300" b="1" dirty="0" err="1" smtClean="0">
-                <a:latin typeface="Consolas" pitchFamily="49" charset="0"/>
-                <a:cs typeface="Consolas" pitchFamily="49" charset="0"/>
-              </a:rPr>
-              <a:t>lst</a:t>
-            </a:r>
-            <a:r>
-              <a:rPr lang="en-US" sz="3300" b="1" dirty="0" smtClean="0">
-                <a:latin typeface="Consolas" pitchFamily="49" charset="0"/>
-                <a:cs typeface="Consolas" pitchFamily="49" charset="0"/>
-              </a:rPr>
-              <a:t>) </a:t>
-            </a:r>
-            <a:r>
-              <a:rPr lang="en-US" sz="3300" dirty="0" smtClean="0"/>
-              <a:t>is always  a non-negative integer.</a:t>
-            </a:r>
-          </a:p>
-          <a:p>
-            <a:pPr lvl="1"/>
-            <a:r>
-              <a:rPr lang="en-US" sz="3300" dirty="0" smtClean="0">
-                <a:solidFill>
-                  <a:srgbClr val="FF0000"/>
-                </a:solidFill>
-              </a:rPr>
-              <a:t>At each recursive call, </a:t>
-            </a:r>
-            <a:r>
-              <a:rPr lang="en-US" sz="3300" b="1" dirty="0" smtClean="0">
-                <a:solidFill>
-                  <a:srgbClr val="FF0000"/>
-                </a:solidFill>
-                <a:latin typeface="Consolas" pitchFamily="49" charset="0"/>
-                <a:cs typeface="Consolas" pitchFamily="49" charset="0"/>
-              </a:rPr>
-              <a:t>(length </a:t>
-            </a:r>
-            <a:r>
-              <a:rPr lang="en-US" sz="3300" b="1" dirty="0" err="1" smtClean="0">
-                <a:solidFill>
-                  <a:srgbClr val="FF0000"/>
-                </a:solidFill>
-                <a:latin typeface="Consolas" pitchFamily="49" charset="0"/>
-                <a:cs typeface="Consolas" pitchFamily="49" charset="0"/>
-              </a:rPr>
-              <a:t>lst</a:t>
-            </a:r>
-            <a:r>
-              <a:rPr lang="en-US" sz="3300" b="1" dirty="0" smtClean="0">
-                <a:solidFill>
-                  <a:srgbClr val="FF0000"/>
-                </a:solidFill>
-                <a:latin typeface="Consolas" pitchFamily="49" charset="0"/>
-                <a:cs typeface="Consolas" pitchFamily="49" charset="0"/>
-              </a:rPr>
-              <a:t>) </a:t>
-            </a:r>
-            <a:r>
-              <a:rPr lang="en-US" sz="3300" dirty="0" smtClean="0">
-                <a:solidFill>
-                  <a:srgbClr val="FF0000"/>
-                </a:solidFill>
-              </a:rPr>
-              <a:t>≥ 2</a:t>
-            </a:r>
-          </a:p>
-          <a:p>
-            <a:pPr lvl="1"/>
-            <a:r>
-              <a:rPr lang="en-US" sz="3300" dirty="0" smtClean="0">
-                <a:solidFill>
-                  <a:srgbClr val="FF0000"/>
-                </a:solidFill>
-              </a:rPr>
-              <a:t>If </a:t>
-            </a:r>
-            <a:r>
-              <a:rPr lang="en-US" sz="3300" b="1" dirty="0" smtClean="0">
-                <a:solidFill>
-                  <a:srgbClr val="FF0000"/>
-                </a:solidFill>
-                <a:latin typeface="Consolas" pitchFamily="49" charset="0"/>
-                <a:cs typeface="Consolas" pitchFamily="49" charset="0"/>
-              </a:rPr>
-              <a:t>(length </a:t>
-            </a:r>
-            <a:r>
-              <a:rPr lang="en-US" sz="3300" b="1" dirty="0" err="1" smtClean="0">
-                <a:solidFill>
-                  <a:srgbClr val="FF0000"/>
-                </a:solidFill>
-                <a:latin typeface="Consolas" pitchFamily="49" charset="0"/>
-                <a:cs typeface="Consolas" pitchFamily="49" charset="0"/>
-              </a:rPr>
-              <a:t>lst</a:t>
-            </a:r>
-            <a:r>
-              <a:rPr lang="en-US" sz="3300" b="1" dirty="0" smtClean="0">
-                <a:solidFill>
-                  <a:srgbClr val="FF0000"/>
-                </a:solidFill>
-                <a:latin typeface="Consolas" pitchFamily="49" charset="0"/>
-                <a:cs typeface="Consolas" pitchFamily="49" charset="0"/>
-              </a:rPr>
-              <a:t>) </a:t>
-            </a:r>
-            <a:r>
-              <a:rPr lang="en-US" sz="3300" dirty="0" smtClean="0">
-                <a:solidFill>
-                  <a:srgbClr val="FF0000"/>
-                </a:solidFill>
-              </a:rPr>
-              <a:t>≥ 2, then </a:t>
-            </a:r>
-          </a:p>
-          <a:p>
-            <a:pPr marL="57150" indent="0">
-              <a:buNone/>
-            </a:pPr>
-            <a:r>
-              <a:rPr lang="en-US" sz="3300" b="1" dirty="0">
-                <a:solidFill>
-                  <a:srgbClr val="FF0000"/>
-                </a:solidFill>
-                <a:latin typeface="Consolas" pitchFamily="49" charset="0"/>
-                <a:cs typeface="Consolas" pitchFamily="49" charset="0"/>
-              </a:rPr>
-              <a:t> </a:t>
-            </a:r>
-            <a:r>
-              <a:rPr lang="en-US" sz="3300" b="1" dirty="0" smtClean="0">
-                <a:solidFill>
-                  <a:srgbClr val="FF0000"/>
-                </a:solidFill>
-                <a:latin typeface="Consolas" pitchFamily="49" charset="0"/>
-                <a:cs typeface="Consolas" pitchFamily="49" charset="0"/>
-              </a:rPr>
-              <a:t> 	(length (even-elements </a:t>
-            </a:r>
-            <a:r>
-              <a:rPr lang="en-US" sz="3300" b="1" dirty="0" err="1" smtClean="0">
-                <a:solidFill>
-                  <a:srgbClr val="FF0000"/>
-                </a:solidFill>
-                <a:latin typeface="Consolas" pitchFamily="49" charset="0"/>
-                <a:cs typeface="Consolas" pitchFamily="49" charset="0"/>
-              </a:rPr>
-              <a:t>lst</a:t>
-            </a:r>
-            <a:r>
-              <a:rPr lang="en-US" sz="3300" b="1" dirty="0" smtClean="0">
-                <a:solidFill>
-                  <a:srgbClr val="FF0000"/>
-                </a:solidFill>
-                <a:latin typeface="Consolas" pitchFamily="49" charset="0"/>
-                <a:cs typeface="Consolas" pitchFamily="49" charset="0"/>
-              </a:rPr>
-              <a:t>))</a:t>
-            </a:r>
-            <a:r>
-              <a:rPr lang="en-US" sz="3300" dirty="0" smtClean="0">
-                <a:solidFill>
-                  <a:srgbClr val="FF0000"/>
-                </a:solidFill>
-              </a:rPr>
-              <a:t> and </a:t>
-            </a:r>
-          </a:p>
-          <a:p>
-            <a:pPr marL="57150" indent="0">
-              <a:buNone/>
-            </a:pPr>
-            <a:r>
-              <a:rPr lang="en-US" sz="3300" b="1" dirty="0">
-                <a:solidFill>
-                  <a:srgbClr val="FF0000"/>
-                </a:solidFill>
-                <a:latin typeface="Consolas" pitchFamily="49" charset="0"/>
-                <a:cs typeface="Consolas" pitchFamily="49" charset="0"/>
-              </a:rPr>
-              <a:t> </a:t>
-            </a:r>
-            <a:r>
-              <a:rPr lang="en-US" sz="3300" b="1" dirty="0" smtClean="0">
-                <a:solidFill>
-                  <a:srgbClr val="FF0000"/>
-                </a:solidFill>
-                <a:latin typeface="Consolas" pitchFamily="49" charset="0"/>
-                <a:cs typeface="Consolas" pitchFamily="49" charset="0"/>
-              </a:rPr>
-              <a:t>	 (length (even-elements (rest </a:t>
-            </a:r>
-            <a:r>
-              <a:rPr lang="en-US" sz="3300" b="1" dirty="0" err="1" smtClean="0">
-                <a:solidFill>
-                  <a:srgbClr val="FF0000"/>
-                </a:solidFill>
-                <a:latin typeface="Consolas" pitchFamily="49" charset="0"/>
-                <a:cs typeface="Consolas" pitchFamily="49" charset="0"/>
-              </a:rPr>
-              <a:t>lst</a:t>
-            </a:r>
-            <a:r>
-              <a:rPr lang="en-US" sz="3300" b="1" dirty="0" smtClean="0">
-                <a:solidFill>
-                  <a:srgbClr val="FF0000"/>
-                </a:solidFill>
-                <a:latin typeface="Consolas" pitchFamily="49" charset="0"/>
-                <a:cs typeface="Consolas" pitchFamily="49" charset="0"/>
-              </a:rPr>
-              <a:t>)))</a:t>
-            </a:r>
-          </a:p>
-          <a:p>
-            <a:pPr marL="57150" indent="0">
-              <a:buNone/>
-            </a:pPr>
-            <a:r>
-              <a:rPr lang="en-US" sz="3300" dirty="0">
-                <a:solidFill>
-                  <a:srgbClr val="FF0000"/>
-                </a:solidFill>
-              </a:rPr>
-              <a:t> </a:t>
-            </a:r>
-            <a:r>
-              <a:rPr lang="en-US" sz="3300" dirty="0" smtClean="0">
-                <a:solidFill>
-                  <a:srgbClr val="FF0000"/>
-                </a:solidFill>
-              </a:rPr>
-              <a:t>  	are both  </a:t>
-            </a:r>
-            <a:r>
-              <a:rPr lang="en-US" sz="3300" b="1" i="1" dirty="0" smtClean="0">
-                <a:solidFill>
-                  <a:schemeClr val="accent3">
-                    <a:lumMod val="50000"/>
-                  </a:schemeClr>
-                </a:solidFill>
-              </a:rPr>
-              <a:t>strictly less </a:t>
-            </a:r>
-            <a:r>
-              <a:rPr lang="en-US" sz="3300" dirty="0" smtClean="0">
-                <a:solidFill>
-                  <a:srgbClr val="FF0000"/>
-                </a:solidFill>
-              </a:rPr>
-              <a:t>than </a:t>
-            </a:r>
-            <a:r>
-              <a:rPr lang="en-US" sz="3300" b="1" dirty="0" smtClean="0">
-                <a:solidFill>
-                  <a:srgbClr val="FF0000"/>
-                </a:solidFill>
-                <a:latin typeface="Consolas" pitchFamily="49" charset="0"/>
-                <a:cs typeface="Consolas" pitchFamily="49" charset="0"/>
-              </a:rPr>
-              <a:t>(length </a:t>
-            </a:r>
-            <a:r>
-              <a:rPr lang="en-US" sz="3300" b="1" dirty="0" err="1" smtClean="0">
-                <a:solidFill>
-                  <a:srgbClr val="FF0000"/>
-                </a:solidFill>
-                <a:latin typeface="Consolas" pitchFamily="49" charset="0"/>
-                <a:cs typeface="Consolas" pitchFamily="49" charset="0"/>
-              </a:rPr>
-              <a:t>lst</a:t>
-            </a:r>
-            <a:r>
-              <a:rPr lang="en-US" sz="3300" b="1" dirty="0" smtClean="0">
-                <a:solidFill>
-                  <a:srgbClr val="FF0000"/>
-                </a:solidFill>
-                <a:latin typeface="Consolas" pitchFamily="49" charset="0"/>
-                <a:cs typeface="Consolas" pitchFamily="49" charset="0"/>
-              </a:rPr>
-              <a:t>).</a:t>
-            </a:r>
-          </a:p>
-          <a:p>
-            <a:pPr marL="57150" indent="0"/>
-            <a:r>
-              <a:rPr lang="en-US" sz="3300" b="1" dirty="0" smtClean="0">
-                <a:latin typeface="Consolas" pitchFamily="49" charset="0"/>
-                <a:cs typeface="Consolas" pitchFamily="49" charset="0"/>
-              </a:rPr>
-              <a:t> </a:t>
-            </a:r>
-            <a:r>
-              <a:rPr lang="en-US" sz="3300" dirty="0" smtClean="0">
-                <a:cs typeface="Consolas" pitchFamily="49" charset="0"/>
-              </a:rPr>
-              <a:t>So</a:t>
-            </a:r>
-            <a:r>
-              <a:rPr lang="en-US" sz="3300" b="1" dirty="0" smtClean="0">
-                <a:latin typeface="Consolas" pitchFamily="49" charset="0"/>
-                <a:cs typeface="Consolas" pitchFamily="49" charset="0"/>
-              </a:rPr>
-              <a:t> (length </a:t>
-            </a:r>
-            <a:r>
-              <a:rPr lang="en-US" sz="3300" b="1" dirty="0" err="1" smtClean="0">
-                <a:latin typeface="Consolas" pitchFamily="49" charset="0"/>
-                <a:cs typeface="Consolas" pitchFamily="49" charset="0"/>
-              </a:rPr>
-              <a:t>lst</a:t>
-            </a:r>
-            <a:r>
-              <a:rPr lang="en-US" sz="3300" b="1" dirty="0" smtClean="0">
-                <a:latin typeface="Consolas" pitchFamily="49" charset="0"/>
-                <a:cs typeface="Consolas" pitchFamily="49" charset="0"/>
-              </a:rPr>
-              <a:t>) </a:t>
-            </a:r>
-            <a:r>
-              <a:rPr lang="en-US" sz="3300" dirty="0" smtClean="0">
-                <a:cs typeface="Consolas" pitchFamily="49" charset="0"/>
-              </a:rPr>
-              <a:t>is a halting measure for </a:t>
-            </a:r>
-            <a:r>
-              <a:rPr lang="en-US" sz="3300" b="1" dirty="0" smtClean="0">
-                <a:latin typeface="Consolas" pitchFamily="49" charset="0"/>
-                <a:cs typeface="Consolas" pitchFamily="49" charset="0"/>
-              </a:rPr>
-              <a:t>merge-sort</a:t>
-            </a:r>
-            <a:r>
-              <a:rPr lang="en-US" sz="3300" dirty="0" smtClean="0">
-                <a:cs typeface="Consolas" pitchFamily="49" charset="0"/>
-              </a:rPr>
-              <a:t>.</a:t>
-            </a:r>
-            <a:endParaRPr lang="en-US" sz="3300" b="1" dirty="0" smtClean="0">
-              <a:latin typeface="Consolas" pitchFamily="49" charset="0"/>
-              <a:cs typeface="Consolas" pitchFamily="49" charset="0"/>
-            </a:endParaRPr>
-          </a:p>
           <a:p>
             <a:pPr marL="457200" lvl="1" indent="0">
               <a:buNone/>
             </a:pPr>
             <a:r>
-              <a:rPr lang="en-US" b="1" dirty="0" smtClean="0">
+              <a:rPr lang="en-US" b="1" dirty="0">
                 <a:solidFill>
                   <a:srgbClr val="FF0000"/>
                 </a:solidFill>
@@ -9018,13 +8632,6 @@
   <p:clrMapOvr>
     <a:masterClrMapping/>
   </p:clrMapOvr>
-  <p:timing>
-    <p:tnLst>
-      <p:par>
-        <p:cTn id="1" dur="indefinite" restart="never" nodeType="tmRoot"/>
-      </p:par>
-    </p:tnLst>
-  </p:timing>
 </p:sld>
 </file>
 
@@ -9061,14 +8668,13 @@
           <a:lstStyle/>
           <a:p>
             <a:r>
-              <a:rPr lang="en-US" dirty="0" smtClean="0"/>
-              <a:t>Halting Measure for </a:t>
-            </a:r>
-            <a:r>
-              <a:rPr lang="en-US" b="1" dirty="0" smtClean="0"/>
+              <a:rPr lang="en-US" dirty="0"/>
+              <a:t>Termination Reasoning for </a:t>
+            </a:r>
+            <a:r>
+              <a:rPr lang="en-US" b="1" dirty="0"/>
               <a:t>merge</a:t>
             </a:r>
-            <a:endParaRPr lang="en-US" b="1" dirty="0"/>
           </a:p>
         </p:txBody>
       </p:sp>
@@ -9090,14 +8696,14 @@
           <a:lstStyle/>
           <a:p>
             <a:r>
-              <a:rPr lang="en-US" dirty="0" smtClean="0"/>
+              <a:rPr lang="en-US" dirty="0"/>
               <a:t>Proposed halting measure: </a:t>
             </a:r>
           </a:p>
           <a:p>
             <a:pPr lvl="1"/>
             <a:r>
-              <a:rPr lang="en-US" b="1" dirty="0" smtClean="0">
+              <a:rPr lang="en-US" b="1" dirty="0">
                 <a:latin typeface="Consolas" panose="020B0609020204030204" pitchFamily="49" charset="0"/>
                 <a:cs typeface="Consolas" panose="020B0609020204030204" pitchFamily="49" charset="0"/>
               </a:rPr>
@@ -9106,14 +8712,14 @@
           </a:p>
           <a:p>
             <a:r>
-              <a:rPr lang="en-US" dirty="0" smtClean="0"/>
+              <a:rPr lang="en-US" dirty="0"/>
               <a:t>Termination argument:</a:t>
             </a:r>
           </a:p>
           <a:p>
             <a:pPr lvl="1"/>
             <a:r>
-              <a:rPr lang="en-US" b="1" dirty="0" smtClean="0">
+              <a:rPr lang="en-US" b="1" dirty="0">
                 <a:solidFill>
                   <a:srgbClr val="FF0000"/>
                 </a:solidFill>
@@ -9123,7 +8729,7 @@
               <a:t>(length lst1) </a:t>
             </a:r>
             <a:r>
-              <a:rPr lang="en-US" dirty="0" smtClean="0">
+              <a:rPr lang="en-US" dirty="0">
                 <a:solidFill>
                   <a:srgbClr val="FF0000"/>
                 </a:solidFill>
@@ -9131,7 +8737,7 @@
               <a:t>and </a:t>
             </a:r>
             <a:r>
-              <a:rPr lang="en-US" b="1" dirty="0" smtClean="0">
+              <a:rPr lang="en-US" b="1" dirty="0">
                 <a:solidFill>
                   <a:srgbClr val="FF0000"/>
                 </a:solidFill>
@@ -9141,7 +8747,7 @@
               <a:t>(length lst2) </a:t>
             </a:r>
             <a:r>
-              <a:rPr lang="en-US" dirty="0" smtClean="0">
+              <a:rPr lang="en-US" dirty="0">
                 <a:solidFill>
                   <a:srgbClr val="FF0000"/>
                 </a:solidFill>
@@ -9152,31 +8758,15 @@
           <a:p>
             <a:pPr lvl="1"/>
             <a:r>
-              <a:rPr lang="en-US" dirty="0" smtClean="0">
+              <a:rPr lang="en-US" dirty="0">
                 <a:solidFill>
                   <a:srgbClr val="FF0000"/>
                 </a:solidFill>
               </a:rPr>
-              <a:t>At each recursive </a:t>
-            </a:r>
-            <a:r>
-              <a:rPr lang="en-US" dirty="0" smtClean="0">
-                <a:solidFill>
-                  <a:srgbClr val="FF0000"/>
-                </a:solidFill>
-              </a:rPr>
-              <a:t>call</a:t>
-            </a:r>
-            <a:r>
-              <a:rPr lang="en-US" dirty="0" smtClean="0">
-                <a:solidFill>
-                  <a:srgbClr val="FF0000"/>
-                </a:solidFill>
-              </a:rPr>
-              <a:t>, either </a:t>
-            </a:r>
-            <a:r>
-              <a:rPr lang="en-US" b="1" dirty="0" smtClean="0">
+              <a:t>At each recursive call, either </a:t>
+            </a:r>
+            <a:r>
+              <a:rPr lang="en-US" b="1" dirty="0">
                 <a:solidFill>
                   <a:srgbClr val="FF0000"/>
                 </a:solidFill>
@@ -9186,7 +8776,7 @@
               <a:t>lst1</a:t>
             </a:r>
             <a:r>
-              <a:rPr lang="en-US" dirty="0" smtClean="0">
+              <a:rPr lang="en-US" dirty="0">
                 <a:solidFill>
                   <a:srgbClr val="FF0000"/>
                 </a:solidFill>
@@ -9194,7 +8784,7 @@
               <a:t> or </a:t>
             </a:r>
             <a:r>
-              <a:rPr lang="en-US" b="1" dirty="0" smtClean="0">
+              <a:rPr lang="en-US" b="1" dirty="0">
                 <a:solidFill>
                   <a:srgbClr val="FF0000"/>
                 </a:solidFill>
@@ -9204,7 +8794,7 @@
               <a:t>lst2</a:t>
             </a:r>
             <a:r>
-              <a:rPr lang="en-US" dirty="0" smtClean="0">
+              <a:rPr lang="en-US" dirty="0">
                 <a:solidFill>
                   <a:srgbClr val="FF0000"/>
                 </a:solidFill>
@@ -9214,29 +8804,28 @@
           </a:p>
           <a:p>
             <a:r>
-              <a:rPr lang="en-US" dirty="0" smtClean="0"/>
+              <a:rPr lang="en-US" dirty="0"/>
               <a:t>So </a:t>
             </a:r>
             <a:r>
-              <a:rPr lang="en-US" b="1" dirty="0" smtClean="0">
+              <a:rPr lang="en-US" b="1" dirty="0">
                 <a:latin typeface="Consolas" panose="020B0609020204030204" pitchFamily="49" charset="0"/>
                 <a:cs typeface="Consolas" panose="020B0609020204030204" pitchFamily="49" charset="0"/>
               </a:rPr>
               <a:t>(length lst1) + (length lst2) </a:t>
             </a:r>
             <a:r>
-              <a:rPr lang="en-US" dirty="0" smtClean="0"/>
+              <a:rPr lang="en-US" dirty="0"/>
               <a:t>is a halting measure for </a:t>
             </a:r>
             <a:r>
-              <a:rPr lang="en-US" b="1" dirty="0" smtClean="0"/>
+              <a:rPr lang="en-US" b="1" dirty="0"/>
               <a:t>merge</a:t>
             </a:r>
             <a:r>
-              <a:rPr lang="en-US" dirty="0" smtClean="0"/>
+              <a:rPr lang="en-US" dirty="0"/>
               <a:t>.</a:t>
             </a:r>
-            <a:endParaRPr lang="en-US" dirty="0"/>
           </a:p>
         </p:txBody>
       </p:sp>

</xml_diff>